<commit_message>
Prezentacio veglegesen elkeszult a hataridore
</commit_message>
<xml_diff>
--- a/doc/Budget App(Pénzmozgást követő alkalmazás).pptx
+++ b/doc/Budget App(Pénzmozgást követő alkalmazás).pptx
@@ -10,16 +10,24 @@
     <p:sldId id="277" r:id="rId4"/>
     <p:sldId id="276" r:id="rId5"/>
     <p:sldId id="275" r:id="rId6"/>
-    <p:sldId id="274" r:id="rId7"/>
-    <p:sldId id="273" r:id="rId8"/>
-    <p:sldId id="272" r:id="rId9"/>
-    <p:sldId id="278" r:id="rId10"/>
-    <p:sldId id="279" r:id="rId11"/>
-    <p:sldId id="280" r:id="rId12"/>
-    <p:sldId id="281" r:id="rId13"/>
-    <p:sldId id="282" r:id="rId14"/>
-    <p:sldId id="283" r:id="rId15"/>
-    <p:sldId id="284" r:id="rId16"/>
+    <p:sldId id="285" r:id="rId7"/>
+    <p:sldId id="274" r:id="rId8"/>
+    <p:sldId id="286" r:id="rId9"/>
+    <p:sldId id="273" r:id="rId10"/>
+    <p:sldId id="272" r:id="rId11"/>
+    <p:sldId id="278" r:id="rId12"/>
+    <p:sldId id="291" r:id="rId13"/>
+    <p:sldId id="279" r:id="rId14"/>
+    <p:sldId id="280" r:id="rId15"/>
+    <p:sldId id="287" r:id="rId16"/>
+    <p:sldId id="288" r:id="rId17"/>
+    <p:sldId id="281" r:id="rId18"/>
+    <p:sldId id="282" r:id="rId19"/>
+    <p:sldId id="283" r:id="rId20"/>
+    <p:sldId id="284" r:id="rId21"/>
+    <p:sldId id="289" r:id="rId22"/>
+    <p:sldId id="290" r:id="rId23"/>
+    <p:sldId id="292" r:id="rId24"/>
   </p:sldIdLst>
   <p:sldSz cx="12192000" cy="6858000"/>
   <p:notesSz cx="6858000" cy="9144000"/>
@@ -118,6 +126,11 @@
       </a:defRPr>
     </a:lvl9pPr>
   </p:defaultTextStyle>
+  <p:extLst>
+    <p:ext uri="{EFAFB233-063F-42B5-8137-9DF3F51BA10A}">
+      <p15:sldGuideLst xmlns:p15="http://schemas.microsoft.com/office/powerpoint/2012/main"/>
+    </p:ext>
+  </p:extLst>
 </p:presentation>
 </file>
 
@@ -3364,7 +3377,7 @@
         </p:blipFill>
         <p:spPr bwMode="auto">
           <a:xfrm>
-            <a:off x="1" y="2507"/>
+            <a:off x="0" y="2507"/>
             <a:ext cx="12192000" cy="6855493"/>
           </a:xfrm>
           <a:prstGeom prst="rect">
@@ -3400,7 +3413,7 @@
         </p:nvSpPr>
         <p:spPr>
           <a:xfrm>
-            <a:off x="1524000" y="3941938"/>
+            <a:off x="1600200" y="303388"/>
             <a:ext cx="9144000" cy="2387600"/>
           </a:xfrm>
         </p:spPr>
@@ -3411,7 +3424,7 @@
             <a:r>
               <a:rPr lang="hu-HU" dirty="0" err="1">
                 <a:solidFill>
-                  <a:srgbClr val="00B050"/>
+                  <a:srgbClr val="FFFF00"/>
                 </a:solidFill>
                 <a:latin typeface="Impact" panose="020B0806030902050204" pitchFamily="34" charset="0"/>
               </a:rPr>
@@ -3420,7 +3433,7 @@
             <a:r>
               <a:rPr lang="hu-HU" dirty="0">
                 <a:solidFill>
-                  <a:srgbClr val="00B050"/>
+                  <a:srgbClr val="FFFF00"/>
                 </a:solidFill>
                 <a:latin typeface="Impact" panose="020B0806030902050204" pitchFamily="34" charset="0"/>
               </a:rPr>
@@ -3429,6 +3442,36 @@
           </a:p>
         </p:txBody>
       </p:sp>
+      <p:pic>
+        <p:nvPicPr>
+          <p:cNvPr id="4" name="Kép 3">
+            <a:extLst>
+              <a:ext uri="{FF2B5EF4-FFF2-40B4-BE49-F238E27FC236}">
+                <a16:creationId xmlns:a16="http://schemas.microsoft.com/office/drawing/2014/main" id="{C4DFC706-B067-615A-23A7-E7E4A0D32FCA}"/>
+              </a:ext>
+            </a:extLst>
+          </p:cNvPr>
+          <p:cNvPicPr>
+            <a:picLocks noChangeAspect="1"/>
+          </p:cNvPicPr>
+          <p:nvPr/>
+        </p:nvPicPr>
+        <p:blipFill>
+          <a:blip r:embed="rId3"/>
+          <a:stretch>
+            <a:fillRect/>
+          </a:stretch>
+        </p:blipFill>
+        <p:spPr>
+          <a:xfrm>
+            <a:off x="1600200" y="3324225"/>
+            <a:ext cx="9144000" cy="2626215"/>
+          </a:xfrm>
+          <a:prstGeom prst="rect">
+            <a:avLst/>
+          </a:prstGeom>
+        </p:spPr>
+      </p:pic>
     </p:spTree>
     <p:extLst>
       <p:ext uri="{BB962C8B-B14F-4D97-AF65-F5344CB8AC3E}">
@@ -3508,10 +3551,10 @@
       </p:pic>
       <p:sp>
         <p:nvSpPr>
-          <p:cNvPr id="4" name="Szövegdoboz 3">
-            <a:extLst>
-              <a:ext uri="{FF2B5EF4-FFF2-40B4-BE49-F238E27FC236}">
-                <a16:creationId xmlns:a16="http://schemas.microsoft.com/office/drawing/2014/main" id="{13A7977C-F2B5-4331-8F2D-3706E3B44E2E}"/>
+          <p:cNvPr id="7" name="Szövegdoboz 6">
+            <a:extLst>
+              <a:ext uri="{FF2B5EF4-FFF2-40B4-BE49-F238E27FC236}">
+                <a16:creationId xmlns:a16="http://schemas.microsoft.com/office/drawing/2014/main" id="{8BC3C534-D40B-45D0-9E01-10168D2DD030}"/>
               </a:ext>
             </a:extLst>
           </p:cNvPr>
@@ -3520,8 +3563,8 @@
         </p:nvSpPr>
         <p:spPr>
           <a:xfrm>
-            <a:off x="1076325" y="342900"/>
-            <a:ext cx="10706100" cy="646331"/>
+            <a:off x="814387" y="624960"/>
+            <a:ext cx="7824788" cy="646331"/>
           </a:xfrm>
           <a:prstGeom prst="rect">
             <a:avLst/>
@@ -3537,21 +3580,21 @@
             <a:r>
               <a:rPr lang="hu-HU" sz="3600" dirty="0">
                 <a:solidFill>
-                  <a:srgbClr val="00B050"/>
+                  <a:srgbClr val="FFFF00"/>
                 </a:solidFill>
                 <a:latin typeface="Impact" panose="020B0806030902050204" pitchFamily="34" charset="0"/>
               </a:rPr>
-              <a:t>Reszponzív web alkalmazás (jegyzetek)</a:t>
+              <a:t>Reszponzív web alkalmazás (kiadások)</a:t>
             </a:r>
           </a:p>
         </p:txBody>
       </p:sp>
       <p:pic>
         <p:nvPicPr>
-          <p:cNvPr id="5" name="Kép 4">
-            <a:extLst>
-              <a:ext uri="{FF2B5EF4-FFF2-40B4-BE49-F238E27FC236}">
-                <a16:creationId xmlns:a16="http://schemas.microsoft.com/office/drawing/2014/main" id="{61C12BEB-1D00-4A53-BF4F-36DA7F3BB04F}"/>
+          <p:cNvPr id="8" name="Kép 7">
+            <a:extLst>
+              <a:ext uri="{FF2B5EF4-FFF2-40B4-BE49-F238E27FC236}">
+                <a16:creationId xmlns:a16="http://schemas.microsoft.com/office/drawing/2014/main" id="{380F6BFE-609B-42B5-BDF7-5DC5E957D48E}"/>
               </a:ext>
             </a:extLst>
           </p:cNvPr>
@@ -3561,25 +3604,198 @@
           <p:nvPr/>
         </p:nvPicPr>
         <p:blipFill>
-          <a:blip r:embed="rId3"/>
+          <a:blip r:embed="rId3">
+            <a:extLst>
+              <a:ext uri="{28A0092B-C50C-407E-A947-70E740481C1C}">
+                <a14:useLocalDpi xmlns:a14="http://schemas.microsoft.com/office/drawing/2010/main" val="0"/>
+              </a:ext>
+            </a:extLst>
+          </a:blip>
           <a:stretch>
             <a:fillRect/>
           </a:stretch>
         </p:blipFill>
         <p:spPr>
           <a:xfrm>
-            <a:off x="841071" y="1543049"/>
-            <a:ext cx="9398304" cy="4608359"/>
+            <a:off x="3449336" y="1685925"/>
+            <a:ext cx="8495013" cy="4154204"/>
           </a:xfrm>
           <a:prstGeom prst="rect">
             <a:avLst/>
           </a:prstGeom>
         </p:spPr>
       </p:pic>
+      <p:sp>
+        <p:nvSpPr>
+          <p:cNvPr id="2" name="Szövegdoboz 1">
+            <a:extLst>
+              <a:ext uri="{FF2B5EF4-FFF2-40B4-BE49-F238E27FC236}">
+                <a16:creationId xmlns:a16="http://schemas.microsoft.com/office/drawing/2014/main" id="{FCF90138-4F9B-DC52-6850-8064D94E3E93}"/>
+              </a:ext>
+            </a:extLst>
+          </p:cNvPr>
+          <p:cNvSpPr txBox="1"/>
+          <p:nvPr/>
+        </p:nvSpPr>
+        <p:spPr>
+          <a:xfrm>
+            <a:off x="962025" y="1638300"/>
+            <a:ext cx="2409825" cy="5170646"/>
+          </a:xfrm>
+          <a:prstGeom prst="rect">
+            <a:avLst/>
+          </a:prstGeom>
+          <a:noFill/>
+        </p:spPr>
+        <p:txBody>
+          <a:bodyPr wrap="square" rtlCol="0">
+            <a:spAutoFit/>
+          </a:bodyPr>
+          <a:lstStyle/>
+          <a:p>
+            <a:pPr marL="285750" marR="0" lvl="0" indent="-285750" algn="l" defTabSz="914400" rtl="0" eaLnBrk="1" fontAlgn="auto" latinLnBrk="0" hangingPunct="1">
+              <a:lnSpc>
+                <a:spcPct val="100000"/>
+              </a:lnSpc>
+              <a:spcBef>
+                <a:spcPts val="0"/>
+              </a:spcBef>
+              <a:spcAft>
+                <a:spcPts val="0"/>
+              </a:spcAft>
+              <a:buClrTx/>
+              <a:buSzTx/>
+              <a:buFont typeface="Arial" panose="020B0604020202020204" pitchFamily="34" charset="0"/>
+              <a:buChar char="•"/>
+              <a:tabLst/>
+              <a:defRPr/>
+            </a:pPr>
+            <a:r>
+              <a:rPr kumimoji="0" lang="hu-HU" sz="2400" b="0" i="0" u="none" strike="noStrike" kern="1200" cap="none" spc="0" normalizeH="0" baseline="0" noProof="0" dirty="0">
+                <a:ln>
+                  <a:noFill/>
+                </a:ln>
+                <a:solidFill>
+                  <a:srgbClr val="FFFF00"/>
+                </a:solidFill>
+                <a:effectLst/>
+                <a:uLnTx/>
+                <a:uFillTx/>
+                <a:latin typeface="Impact" panose="020B0806030902050204" pitchFamily="34" charset="0"/>
+                <a:ea typeface="+mn-ea"/>
+                <a:cs typeface="+mn-cs"/>
+              </a:rPr>
+              <a:t>Itt láthatjuk a kiadásainkat dátum szerint csoportosítva, </a:t>
+            </a:r>
+            <a:r>
+              <a:rPr lang="hu-HU" sz="2400" dirty="0">
+                <a:solidFill>
+                  <a:srgbClr val="FFFF00"/>
+                </a:solidFill>
+                <a:latin typeface="Impact" panose="020B0806030902050204" pitchFamily="34" charset="0"/>
+              </a:rPr>
+              <a:t> a </a:t>
+            </a:r>
+            <a:r>
+              <a:rPr kumimoji="0" lang="hu-HU" sz="2400" b="0" i="0" u="none" strike="noStrike" kern="1200" cap="none" spc="0" normalizeH="0" baseline="0" noProof="0" dirty="0">
+                <a:ln>
+                  <a:noFill/>
+                </a:ln>
+                <a:solidFill>
+                  <a:srgbClr val="FFFF00"/>
+                </a:solidFill>
+                <a:effectLst/>
+                <a:uLnTx/>
+                <a:uFillTx/>
+                <a:latin typeface="Impact" panose="020B0806030902050204" pitchFamily="34" charset="0"/>
+                <a:ea typeface="+mn-ea"/>
+                <a:cs typeface="+mn-cs"/>
+              </a:rPr>
+              <a:t>legutóbbi kiadás jelenik meg elsőnek</a:t>
+            </a:r>
+          </a:p>
+          <a:p>
+            <a:pPr marL="285750" marR="0" lvl="0" indent="-285750" algn="l" defTabSz="914400" rtl="0" eaLnBrk="1" fontAlgn="auto" latinLnBrk="0" hangingPunct="1">
+              <a:lnSpc>
+                <a:spcPct val="100000"/>
+              </a:lnSpc>
+              <a:spcBef>
+                <a:spcPts val="0"/>
+              </a:spcBef>
+              <a:spcAft>
+                <a:spcPts val="0"/>
+              </a:spcAft>
+              <a:buClrTx/>
+              <a:buSzTx/>
+              <a:buFont typeface="Arial" panose="020B0604020202020204" pitchFamily="34" charset="0"/>
+              <a:buChar char="•"/>
+              <a:tabLst/>
+              <a:defRPr/>
+            </a:pPr>
+            <a:endParaRPr kumimoji="0" lang="hu-HU" sz="2400" b="0" i="0" u="none" strike="noStrike" kern="1200" cap="none" spc="0" normalizeH="0" baseline="0" noProof="0" dirty="0">
+              <a:ln>
+                <a:noFill/>
+              </a:ln>
+              <a:solidFill>
+                <a:srgbClr val="FFFF00"/>
+              </a:solidFill>
+              <a:effectLst/>
+              <a:uLnTx/>
+              <a:uFillTx/>
+              <a:latin typeface="Impact" panose="020B0806030902050204" pitchFamily="34" charset="0"/>
+              <a:ea typeface="+mn-ea"/>
+              <a:cs typeface="+mn-cs"/>
+            </a:endParaRPr>
+          </a:p>
+          <a:p>
+            <a:pPr marL="285750" marR="0" lvl="0" indent="-285750" algn="l" defTabSz="914400" rtl="0" eaLnBrk="1" fontAlgn="auto" latinLnBrk="0" hangingPunct="1">
+              <a:lnSpc>
+                <a:spcPct val="100000"/>
+              </a:lnSpc>
+              <a:spcBef>
+                <a:spcPts val="0"/>
+              </a:spcBef>
+              <a:spcAft>
+                <a:spcPts val="0"/>
+              </a:spcAft>
+              <a:buClrTx/>
+              <a:buSzTx/>
+              <a:buFont typeface="Arial" panose="020B0604020202020204" pitchFamily="34" charset="0"/>
+              <a:buChar char="•"/>
+              <a:tabLst/>
+              <a:defRPr/>
+            </a:pPr>
+            <a:r>
+              <a:rPr kumimoji="0" lang="hu-HU" sz="2400" b="0" i="0" u="none" strike="noStrike" kern="1200" cap="none" spc="0" normalizeH="0" baseline="0" noProof="0" dirty="0">
+                <a:ln>
+                  <a:noFill/>
+                </a:ln>
+                <a:solidFill>
+                  <a:srgbClr val="FFFF00"/>
+                </a:solidFill>
+                <a:effectLst/>
+                <a:uLnTx/>
+                <a:uFillTx/>
+                <a:latin typeface="Impact" panose="020B0806030902050204" pitchFamily="34" charset="0"/>
+                <a:ea typeface="+mn-ea"/>
+                <a:cs typeface="+mn-cs"/>
+              </a:rPr>
+              <a:t>Itt tudunk hozzáadni, módosítani és törölni kiadásokat</a:t>
+            </a:r>
+          </a:p>
+          <a:p>
+            <a:endParaRPr lang="hu-HU" dirty="0">
+              <a:solidFill>
+                <a:srgbClr val="FFFF00"/>
+              </a:solidFill>
+            </a:endParaRPr>
+          </a:p>
+        </p:txBody>
+      </p:sp>
     </p:spTree>
     <p:extLst>
       <p:ext uri="{BB962C8B-B14F-4D97-AF65-F5344CB8AC3E}">
-        <p14:creationId xmlns:p14="http://schemas.microsoft.com/office/powerpoint/2010/main" val="1243799727"/>
+        <p14:creationId xmlns:p14="http://schemas.microsoft.com/office/powerpoint/2010/main" val="2480642691"/>
       </p:ext>
     </p:extLst>
   </p:cSld>
@@ -3635,7 +3851,7 @@
         </p:blipFill>
         <p:spPr bwMode="auto">
           <a:xfrm>
-            <a:off x="1" y="2507"/>
+            <a:off x="0" y="2507"/>
             <a:ext cx="12192000" cy="6855493"/>
           </a:xfrm>
           <a:prstGeom prst="rect">
@@ -3653,10 +3869,146 @@
           </a:extLst>
         </p:spPr>
       </p:pic>
+      <p:sp>
+        <p:nvSpPr>
+          <p:cNvPr id="4" name="Szövegdoboz 3">
+            <a:extLst>
+              <a:ext uri="{FF2B5EF4-FFF2-40B4-BE49-F238E27FC236}">
+                <a16:creationId xmlns:a16="http://schemas.microsoft.com/office/drawing/2014/main" id="{D9680602-7B8F-4B6D-B76C-4A2160ADFC21}"/>
+              </a:ext>
+            </a:extLst>
+          </p:cNvPr>
+          <p:cNvSpPr txBox="1"/>
+          <p:nvPr/>
+        </p:nvSpPr>
+        <p:spPr>
+          <a:xfrm>
+            <a:off x="133349" y="619125"/>
+            <a:ext cx="11649189" cy="646331"/>
+          </a:xfrm>
+          <a:prstGeom prst="rect">
+            <a:avLst/>
+          </a:prstGeom>
+          <a:noFill/>
+        </p:spPr>
+        <p:txBody>
+          <a:bodyPr wrap="square">
+            <a:spAutoFit/>
+          </a:bodyPr>
+          <a:lstStyle/>
+          <a:p>
+            <a:r>
+              <a:rPr lang="hu-HU" sz="3600" dirty="0">
+                <a:solidFill>
+                  <a:srgbClr val="FFFF00"/>
+                </a:solidFill>
+                <a:latin typeface="Impact" panose="020B0806030902050204" pitchFamily="34" charset="0"/>
+              </a:rPr>
+              <a:t>Reszponzív web alkalmazás (mindent összefoglaló nézet)</a:t>
+            </a:r>
+          </a:p>
+        </p:txBody>
+      </p:sp>
+      <p:pic>
+        <p:nvPicPr>
+          <p:cNvPr id="9" name="Kép 8">
+            <a:extLst>
+              <a:ext uri="{FF2B5EF4-FFF2-40B4-BE49-F238E27FC236}">
+                <a16:creationId xmlns:a16="http://schemas.microsoft.com/office/drawing/2014/main" id="{6754EF42-9E9D-40CF-9808-7CBA09CF61C2}"/>
+              </a:ext>
+            </a:extLst>
+          </p:cNvPr>
+          <p:cNvPicPr>
+            <a:picLocks noChangeAspect="1"/>
+          </p:cNvPicPr>
+          <p:nvPr/>
+        </p:nvPicPr>
+        <p:blipFill>
+          <a:blip r:embed="rId3"/>
+          <a:stretch>
+            <a:fillRect/>
+          </a:stretch>
+        </p:blipFill>
+        <p:spPr>
+          <a:xfrm>
+            <a:off x="409461" y="1398029"/>
+            <a:ext cx="5219700" cy="2509262"/>
+          </a:xfrm>
+          <a:prstGeom prst="rect">
+            <a:avLst/>
+          </a:prstGeom>
+        </p:spPr>
+      </p:pic>
+      <p:pic>
+        <p:nvPicPr>
+          <p:cNvPr id="11" name="Kép 10">
+            <a:extLst>
+              <a:ext uri="{FF2B5EF4-FFF2-40B4-BE49-F238E27FC236}">
+                <a16:creationId xmlns:a16="http://schemas.microsoft.com/office/drawing/2014/main" id="{BB1FD7AB-4BAE-4CBE-87D4-C44C6044B41E}"/>
+              </a:ext>
+            </a:extLst>
+          </p:cNvPr>
+          <p:cNvPicPr>
+            <a:picLocks noChangeAspect="1"/>
+          </p:cNvPicPr>
+          <p:nvPr/>
+        </p:nvPicPr>
+        <p:blipFill>
+          <a:blip r:embed="rId4"/>
+          <a:stretch>
+            <a:fillRect/>
+          </a:stretch>
+        </p:blipFill>
+        <p:spPr>
+          <a:xfrm>
+            <a:off x="6096000" y="1398029"/>
+            <a:ext cx="5736196" cy="2529669"/>
+          </a:xfrm>
+          <a:prstGeom prst="rect">
+            <a:avLst/>
+          </a:prstGeom>
+        </p:spPr>
+      </p:pic>
+      <p:pic>
+        <p:nvPicPr>
+          <p:cNvPr id="13" name="Kép 12">
+            <a:extLst>
+              <a:ext uri="{FF2B5EF4-FFF2-40B4-BE49-F238E27FC236}">
+                <a16:creationId xmlns:a16="http://schemas.microsoft.com/office/drawing/2014/main" id="{E313FFB6-02BD-4E12-83C5-EEDA7A5B2327}"/>
+              </a:ext>
+            </a:extLst>
+          </p:cNvPr>
+          <p:cNvPicPr>
+            <a:picLocks noChangeAspect="1"/>
+          </p:cNvPicPr>
+          <p:nvPr/>
+        </p:nvPicPr>
+        <p:blipFill>
+          <a:blip r:embed="rId5">
+            <a:extLst>
+              <a:ext uri="{28A0092B-C50C-407E-A947-70E740481C1C}">
+                <a14:useLocalDpi xmlns:a14="http://schemas.microsoft.com/office/drawing/2010/main" val="0"/>
+              </a:ext>
+            </a:extLst>
+          </a:blip>
+          <a:stretch>
+            <a:fillRect/>
+          </a:stretch>
+        </p:blipFill>
+        <p:spPr>
+          <a:xfrm>
+            <a:off x="2709162" y="4006241"/>
+            <a:ext cx="5924639" cy="2810496"/>
+          </a:xfrm>
+          <a:prstGeom prst="rect">
+            <a:avLst/>
+          </a:prstGeom>
+        </p:spPr>
+      </p:pic>
     </p:spTree>
     <p:extLst>
       <p:ext uri="{BB962C8B-B14F-4D97-AF65-F5344CB8AC3E}">
-        <p14:creationId xmlns:p14="http://schemas.microsoft.com/office/powerpoint/2010/main" val="3425398856"/>
+        <p14:creationId xmlns:p14="http://schemas.microsoft.com/office/powerpoint/2010/main" val="967772040"/>
       </p:ext>
     </p:extLst>
   </p:cSld>
@@ -3712,7 +4064,7 @@
         </p:blipFill>
         <p:spPr bwMode="auto">
           <a:xfrm>
-            <a:off x="1" y="2507"/>
+            <a:off x="0" y="2507"/>
             <a:ext cx="12192000" cy="6855493"/>
           </a:xfrm>
           <a:prstGeom prst="rect">
@@ -3730,10 +4082,189 @@
           </a:extLst>
         </p:spPr>
       </p:pic>
+      <p:sp>
+        <p:nvSpPr>
+          <p:cNvPr id="2" name="Szövegdoboz 1">
+            <a:extLst>
+              <a:ext uri="{FF2B5EF4-FFF2-40B4-BE49-F238E27FC236}">
+                <a16:creationId xmlns:a16="http://schemas.microsoft.com/office/drawing/2014/main" id="{97EA9760-E7DB-0E63-0F3A-0B42E968B1C7}"/>
+              </a:ext>
+            </a:extLst>
+          </p:cNvPr>
+          <p:cNvSpPr txBox="1"/>
+          <p:nvPr/>
+        </p:nvSpPr>
+        <p:spPr>
+          <a:xfrm>
+            <a:off x="1476375" y="552450"/>
+            <a:ext cx="7953375" cy="2308324"/>
+          </a:xfrm>
+          <a:prstGeom prst="rect">
+            <a:avLst/>
+          </a:prstGeom>
+          <a:noFill/>
+        </p:spPr>
+        <p:txBody>
+          <a:bodyPr wrap="square" rtlCol="0">
+            <a:spAutoFit/>
+          </a:bodyPr>
+          <a:lstStyle/>
+          <a:p>
+            <a:pPr marL="342900" indent="-342900">
+              <a:buFont typeface="Arial" panose="020B0604020202020204" pitchFamily="34" charset="0"/>
+              <a:buChar char="•"/>
+            </a:pPr>
+            <a:r>
+              <a:rPr lang="hu-HU" sz="2400" dirty="0">
+                <a:solidFill>
+                  <a:srgbClr val="FFFF00"/>
+                </a:solidFill>
+                <a:latin typeface="Impact" panose="020B0806030902050204" pitchFamily="34" charset="0"/>
+              </a:rPr>
+              <a:t>Az összefoglaló nézetben láthatjuk az eddigi összes felvett bevételt és kiadást </a:t>
+            </a:r>
+          </a:p>
+          <a:p>
+            <a:pPr marL="342900" indent="-342900">
+              <a:buFont typeface="Arial" panose="020B0604020202020204" pitchFamily="34" charset="0"/>
+              <a:buChar char="•"/>
+            </a:pPr>
+            <a:endParaRPr lang="hu-HU" sz="2400" dirty="0">
+              <a:solidFill>
+                <a:srgbClr val="FFFF00"/>
+              </a:solidFill>
+              <a:latin typeface="Impact" panose="020B0806030902050204" pitchFamily="34" charset="0"/>
+            </a:endParaRPr>
+          </a:p>
+          <a:p>
+            <a:pPr marL="342900" indent="-342900">
+              <a:buFont typeface="Arial" panose="020B0604020202020204" pitchFamily="34" charset="0"/>
+              <a:buChar char="•"/>
+            </a:pPr>
+            <a:r>
+              <a:rPr lang="hu-HU" sz="2400" dirty="0">
+                <a:solidFill>
+                  <a:srgbClr val="FFFF00"/>
+                </a:solidFill>
+                <a:latin typeface="Impact" panose="020B0806030902050204" pitchFamily="34" charset="0"/>
+              </a:rPr>
+              <a:t>Új bevételt, kiadást vagy jegyzetet felvenni az alábbi három űrlapon tudunk</a:t>
+            </a:r>
+          </a:p>
+          <a:p>
+            <a:pPr marL="342900" indent="-342900">
+              <a:buFont typeface="Arial" panose="020B0604020202020204" pitchFamily="34" charset="0"/>
+              <a:buChar char="•"/>
+            </a:pPr>
+            <a:endParaRPr lang="hu-HU" sz="2400" dirty="0">
+              <a:solidFill>
+                <a:srgbClr val="FFFF00"/>
+              </a:solidFill>
+              <a:latin typeface="Impact" panose="020B0806030902050204" pitchFamily="34" charset="0"/>
+            </a:endParaRPr>
+          </a:p>
+        </p:txBody>
+      </p:sp>
+      <p:pic>
+        <p:nvPicPr>
+          <p:cNvPr id="5" name="Kép 4">
+            <a:extLst>
+              <a:ext uri="{FF2B5EF4-FFF2-40B4-BE49-F238E27FC236}">
+                <a16:creationId xmlns:a16="http://schemas.microsoft.com/office/drawing/2014/main" id="{965018B6-EC14-8B38-C906-E84BD808D3A8}"/>
+              </a:ext>
+            </a:extLst>
+          </p:cNvPr>
+          <p:cNvPicPr>
+            <a:picLocks noChangeAspect="1"/>
+          </p:cNvPicPr>
+          <p:nvPr/>
+        </p:nvPicPr>
+        <p:blipFill>
+          <a:blip r:embed="rId3">
+            <a:extLst>
+              <a:ext uri="{28A0092B-C50C-407E-A947-70E740481C1C}">
+                <a14:useLocalDpi xmlns:a14="http://schemas.microsoft.com/office/drawing/2010/main" val="0"/>
+              </a:ext>
+            </a:extLst>
+          </a:blip>
+          <a:stretch>
+            <a:fillRect/>
+          </a:stretch>
+        </p:blipFill>
+        <p:spPr>
+          <a:xfrm>
+            <a:off x="371474" y="2858951"/>
+            <a:ext cx="5457825" cy="1657635"/>
+          </a:xfrm>
+          <a:prstGeom prst="rect">
+            <a:avLst/>
+          </a:prstGeom>
+        </p:spPr>
+      </p:pic>
+      <p:pic>
+        <p:nvPicPr>
+          <p:cNvPr id="7" name="Kép 6">
+            <a:extLst>
+              <a:ext uri="{FF2B5EF4-FFF2-40B4-BE49-F238E27FC236}">
+                <a16:creationId xmlns:a16="http://schemas.microsoft.com/office/drawing/2014/main" id="{AE6E285E-10AB-7766-69B1-151A6D5CE055}"/>
+              </a:ext>
+            </a:extLst>
+          </p:cNvPr>
+          <p:cNvPicPr>
+            <a:picLocks noChangeAspect="1"/>
+          </p:cNvPicPr>
+          <p:nvPr/>
+        </p:nvPicPr>
+        <p:blipFill>
+          <a:blip r:embed="rId4"/>
+          <a:stretch>
+            <a:fillRect/>
+          </a:stretch>
+        </p:blipFill>
+        <p:spPr>
+          <a:xfrm>
+            <a:off x="6278127" y="2838451"/>
+            <a:ext cx="5542399" cy="1676311"/>
+          </a:xfrm>
+          <a:prstGeom prst="rect">
+            <a:avLst/>
+          </a:prstGeom>
+        </p:spPr>
+      </p:pic>
+      <p:pic>
+        <p:nvPicPr>
+          <p:cNvPr id="10" name="Kép 9">
+            <a:extLst>
+              <a:ext uri="{FF2B5EF4-FFF2-40B4-BE49-F238E27FC236}">
+                <a16:creationId xmlns:a16="http://schemas.microsoft.com/office/drawing/2014/main" id="{CAB6F08D-FE3E-5F8B-6243-362927031D88}"/>
+              </a:ext>
+            </a:extLst>
+          </p:cNvPr>
+          <p:cNvPicPr>
+            <a:picLocks noChangeAspect="1"/>
+          </p:cNvPicPr>
+          <p:nvPr/>
+        </p:nvPicPr>
+        <p:blipFill>
+          <a:blip r:embed="rId5"/>
+          <a:stretch>
+            <a:fillRect/>
+          </a:stretch>
+        </p:blipFill>
+        <p:spPr>
+          <a:xfrm>
+            <a:off x="3648074" y="4841869"/>
+            <a:ext cx="5616000" cy="1680210"/>
+          </a:xfrm>
+          <a:prstGeom prst="rect">
+            <a:avLst/>
+          </a:prstGeom>
+        </p:spPr>
+      </p:pic>
     </p:spTree>
     <p:extLst>
       <p:ext uri="{BB962C8B-B14F-4D97-AF65-F5344CB8AC3E}">
-        <p14:creationId xmlns:p14="http://schemas.microsoft.com/office/powerpoint/2010/main" val="1573137498"/>
+        <p14:creationId xmlns:p14="http://schemas.microsoft.com/office/powerpoint/2010/main" val="2960131073"/>
       </p:ext>
     </p:extLst>
   </p:cSld>
@@ -3807,10 +4338,240 @@
           </a:extLst>
         </p:spPr>
       </p:pic>
+      <p:sp>
+        <p:nvSpPr>
+          <p:cNvPr id="4" name="Szövegdoboz 3">
+            <a:extLst>
+              <a:ext uri="{FF2B5EF4-FFF2-40B4-BE49-F238E27FC236}">
+                <a16:creationId xmlns:a16="http://schemas.microsoft.com/office/drawing/2014/main" id="{13A7977C-F2B5-4331-8F2D-3706E3B44E2E}"/>
+              </a:ext>
+            </a:extLst>
+          </p:cNvPr>
+          <p:cNvSpPr txBox="1"/>
+          <p:nvPr/>
+        </p:nvSpPr>
+        <p:spPr>
+          <a:xfrm>
+            <a:off x="1076325" y="342900"/>
+            <a:ext cx="10706100" cy="646331"/>
+          </a:xfrm>
+          <a:prstGeom prst="rect">
+            <a:avLst/>
+          </a:prstGeom>
+          <a:noFill/>
+        </p:spPr>
+        <p:txBody>
+          <a:bodyPr wrap="square">
+            <a:spAutoFit/>
+          </a:bodyPr>
+          <a:lstStyle/>
+          <a:p>
+            <a:r>
+              <a:rPr lang="hu-HU" sz="3600" dirty="0">
+                <a:solidFill>
+                  <a:srgbClr val="FFFF00"/>
+                </a:solidFill>
+                <a:latin typeface="Impact" panose="020B0806030902050204" pitchFamily="34" charset="0"/>
+              </a:rPr>
+              <a:t>Reszponzív web alkalmazás (jegyzetek)</a:t>
+            </a:r>
+          </a:p>
+        </p:txBody>
+      </p:sp>
+      <p:pic>
+        <p:nvPicPr>
+          <p:cNvPr id="5" name="Kép 4">
+            <a:extLst>
+              <a:ext uri="{FF2B5EF4-FFF2-40B4-BE49-F238E27FC236}">
+                <a16:creationId xmlns:a16="http://schemas.microsoft.com/office/drawing/2014/main" id="{61C12BEB-1D00-4A53-BF4F-36DA7F3BB04F}"/>
+              </a:ext>
+            </a:extLst>
+          </p:cNvPr>
+          <p:cNvPicPr>
+            <a:picLocks noChangeAspect="1"/>
+          </p:cNvPicPr>
+          <p:nvPr/>
+        </p:nvPicPr>
+        <p:blipFill>
+          <a:blip r:embed="rId3"/>
+          <a:stretch>
+            <a:fillRect/>
+          </a:stretch>
+        </p:blipFill>
+        <p:spPr>
+          <a:xfrm>
+            <a:off x="3648075" y="1480203"/>
+            <a:ext cx="8372474" cy="4105354"/>
+          </a:xfrm>
+          <a:prstGeom prst="rect">
+            <a:avLst/>
+          </a:prstGeom>
+        </p:spPr>
+      </p:pic>
+      <p:sp>
+        <p:nvSpPr>
+          <p:cNvPr id="8" name="Szövegdoboz 7">
+            <a:extLst>
+              <a:ext uri="{FF2B5EF4-FFF2-40B4-BE49-F238E27FC236}">
+                <a16:creationId xmlns:a16="http://schemas.microsoft.com/office/drawing/2014/main" id="{4E659A20-ACE8-B893-44FE-04478629CC8E}"/>
+              </a:ext>
+            </a:extLst>
+          </p:cNvPr>
+          <p:cNvSpPr txBox="1"/>
+          <p:nvPr/>
+        </p:nvSpPr>
+        <p:spPr>
+          <a:xfrm>
+            <a:off x="504827" y="1905506"/>
+            <a:ext cx="3143248" cy="3785652"/>
+          </a:xfrm>
+          <a:prstGeom prst="rect">
+            <a:avLst/>
+          </a:prstGeom>
+          <a:noFill/>
+        </p:spPr>
+        <p:txBody>
+          <a:bodyPr wrap="square">
+            <a:spAutoFit/>
+          </a:bodyPr>
+          <a:lstStyle/>
+          <a:p>
+            <a:pPr marL="285750" marR="0" lvl="0" indent="-285750" algn="l" defTabSz="914400" rtl="0" eaLnBrk="1" fontAlgn="auto" latinLnBrk="0" hangingPunct="1">
+              <a:lnSpc>
+                <a:spcPct val="100000"/>
+              </a:lnSpc>
+              <a:spcBef>
+                <a:spcPts val="0"/>
+              </a:spcBef>
+              <a:spcAft>
+                <a:spcPts val="0"/>
+              </a:spcAft>
+              <a:buClrTx/>
+              <a:buSzTx/>
+              <a:buFont typeface="Arial" panose="020B0604020202020204" pitchFamily="34" charset="0"/>
+              <a:buChar char="•"/>
+              <a:tabLst/>
+              <a:defRPr/>
+            </a:pPr>
+            <a:r>
+              <a:rPr kumimoji="0" lang="hu-HU" sz="2400" b="0" i="0" u="none" strike="noStrike" kern="1200" cap="none" spc="0" normalizeH="0" baseline="0" noProof="0" dirty="0">
+                <a:ln>
+                  <a:noFill/>
+                </a:ln>
+                <a:solidFill>
+                  <a:srgbClr val="FFFF00"/>
+                </a:solidFill>
+                <a:effectLst/>
+                <a:uLnTx/>
+                <a:uFillTx/>
+                <a:latin typeface="Impact" panose="020B0806030902050204" pitchFamily="34" charset="0"/>
+                <a:ea typeface="+mn-ea"/>
+                <a:cs typeface="+mn-cs"/>
+              </a:rPr>
+              <a:t>Itt láthatjuk a jegyzeteinket dátum szerint csoportosítva, </a:t>
+            </a:r>
+            <a:r>
+              <a:rPr lang="hu-HU" sz="2400" dirty="0">
+                <a:solidFill>
+                  <a:srgbClr val="FFFF00"/>
+                </a:solidFill>
+                <a:latin typeface="Impact" panose="020B0806030902050204" pitchFamily="34" charset="0"/>
+              </a:rPr>
+              <a:t>a </a:t>
+            </a:r>
+            <a:r>
+              <a:rPr kumimoji="0" lang="hu-HU" sz="2400" b="0" i="0" u="none" strike="noStrike" kern="1200" cap="none" spc="0" normalizeH="0" baseline="0" noProof="0" dirty="0">
+                <a:ln>
+                  <a:noFill/>
+                </a:ln>
+                <a:solidFill>
+                  <a:srgbClr val="FFFF00"/>
+                </a:solidFill>
+                <a:effectLst/>
+                <a:uLnTx/>
+                <a:uFillTx/>
+                <a:latin typeface="Impact" panose="020B0806030902050204" pitchFamily="34" charset="0"/>
+                <a:ea typeface="+mn-ea"/>
+                <a:cs typeface="+mn-cs"/>
+              </a:rPr>
+              <a:t>legutóbbi jegyzet jelenik meg elsőnek</a:t>
+            </a:r>
+          </a:p>
+          <a:p>
+            <a:pPr marL="285750" marR="0" lvl="0" indent="-285750" algn="l" defTabSz="914400" rtl="0" eaLnBrk="1" fontAlgn="auto" latinLnBrk="0" hangingPunct="1">
+              <a:lnSpc>
+                <a:spcPct val="100000"/>
+              </a:lnSpc>
+              <a:spcBef>
+                <a:spcPts val="0"/>
+              </a:spcBef>
+              <a:spcAft>
+                <a:spcPts val="0"/>
+              </a:spcAft>
+              <a:buClrTx/>
+              <a:buSzTx/>
+              <a:buFont typeface="Arial" panose="020B0604020202020204" pitchFamily="34" charset="0"/>
+              <a:buChar char="•"/>
+              <a:tabLst/>
+              <a:defRPr/>
+            </a:pPr>
+            <a:endParaRPr kumimoji="0" lang="hu-HU" sz="2400" b="0" i="0" u="none" strike="noStrike" kern="1200" cap="none" spc="0" normalizeH="0" baseline="0" noProof="0" dirty="0">
+              <a:ln>
+                <a:noFill/>
+              </a:ln>
+              <a:solidFill>
+                <a:srgbClr val="FFFF00"/>
+              </a:solidFill>
+              <a:effectLst/>
+              <a:uLnTx/>
+              <a:uFillTx/>
+              <a:latin typeface="Impact" panose="020B0806030902050204" pitchFamily="34" charset="0"/>
+              <a:ea typeface="+mn-ea"/>
+              <a:cs typeface="+mn-cs"/>
+            </a:endParaRPr>
+          </a:p>
+          <a:p>
+            <a:pPr marL="285750" marR="0" lvl="0" indent="-285750" algn="l" defTabSz="914400" rtl="0" eaLnBrk="1" fontAlgn="auto" latinLnBrk="0" hangingPunct="1">
+              <a:lnSpc>
+                <a:spcPct val="100000"/>
+              </a:lnSpc>
+              <a:spcBef>
+                <a:spcPts val="0"/>
+              </a:spcBef>
+              <a:spcAft>
+                <a:spcPts val="0"/>
+              </a:spcAft>
+              <a:buClrTx/>
+              <a:buSzTx/>
+              <a:buFont typeface="Arial" panose="020B0604020202020204" pitchFamily="34" charset="0"/>
+              <a:buChar char="•"/>
+              <a:tabLst/>
+              <a:defRPr/>
+            </a:pPr>
+            <a:r>
+              <a:rPr kumimoji="0" lang="hu-HU" sz="2400" b="0" i="0" u="none" strike="noStrike" kern="1200" cap="none" spc="0" normalizeH="0" baseline="0" noProof="0" dirty="0">
+                <a:ln>
+                  <a:noFill/>
+                </a:ln>
+                <a:solidFill>
+                  <a:srgbClr val="FFFF00"/>
+                </a:solidFill>
+                <a:effectLst/>
+                <a:uLnTx/>
+                <a:uFillTx/>
+                <a:latin typeface="Impact" panose="020B0806030902050204" pitchFamily="34" charset="0"/>
+                <a:ea typeface="+mn-ea"/>
+                <a:cs typeface="+mn-cs"/>
+              </a:rPr>
+              <a:t>Itt tudunk hozzáadni, módosítani és törölni jegyzeteket</a:t>
+            </a:r>
+          </a:p>
+        </p:txBody>
+      </p:sp>
     </p:spTree>
     <p:extLst>
       <p:ext uri="{BB962C8B-B14F-4D97-AF65-F5344CB8AC3E}">
-        <p14:creationId xmlns:p14="http://schemas.microsoft.com/office/powerpoint/2010/main" val="1529009243"/>
+        <p14:creationId xmlns:p14="http://schemas.microsoft.com/office/powerpoint/2010/main" val="1243799727"/>
       </p:ext>
     </p:extLst>
   </p:cSld>
@@ -3884,10 +4645,167 @@
           </a:extLst>
         </p:spPr>
       </p:pic>
+      <p:sp>
+        <p:nvSpPr>
+          <p:cNvPr id="2" name="Szövegdoboz 1">
+            <a:extLst>
+              <a:ext uri="{FF2B5EF4-FFF2-40B4-BE49-F238E27FC236}">
+                <a16:creationId xmlns:a16="http://schemas.microsoft.com/office/drawing/2014/main" id="{03D1C8E6-E711-48BF-A058-4091BFE0E6A5}"/>
+              </a:ext>
+            </a:extLst>
+          </p:cNvPr>
+          <p:cNvSpPr txBox="1"/>
+          <p:nvPr/>
+        </p:nvSpPr>
+        <p:spPr>
+          <a:xfrm>
+            <a:off x="1143000" y="446901"/>
+            <a:ext cx="6553200" cy="646331"/>
+          </a:xfrm>
+          <a:prstGeom prst="rect">
+            <a:avLst/>
+          </a:prstGeom>
+          <a:noFill/>
+        </p:spPr>
+        <p:txBody>
+          <a:bodyPr wrap="square" rtlCol="0">
+            <a:spAutoFit/>
+          </a:bodyPr>
+          <a:lstStyle/>
+          <a:p>
+            <a:r>
+              <a:rPr lang="hu-HU" sz="3600" dirty="0">
+                <a:solidFill>
+                  <a:srgbClr val="FFFF00"/>
+                </a:solidFill>
+                <a:latin typeface="Impact" panose="020B0806030902050204" pitchFamily="34" charset="0"/>
+              </a:rPr>
+              <a:t>Reszponzivítás a gyakorlatban</a:t>
+            </a:r>
+          </a:p>
+        </p:txBody>
+      </p:sp>
+      <p:pic>
+        <p:nvPicPr>
+          <p:cNvPr id="6" name="Kép 5">
+            <a:extLst>
+              <a:ext uri="{FF2B5EF4-FFF2-40B4-BE49-F238E27FC236}">
+                <a16:creationId xmlns:a16="http://schemas.microsoft.com/office/drawing/2014/main" id="{EA35A18F-2BF4-4E58-8149-1F1D8FC11D6A}"/>
+              </a:ext>
+            </a:extLst>
+          </p:cNvPr>
+          <p:cNvPicPr>
+            <a:picLocks noChangeAspect="1"/>
+          </p:cNvPicPr>
+          <p:nvPr/>
+        </p:nvPicPr>
+        <p:blipFill>
+          <a:blip r:embed="rId3"/>
+          <a:stretch>
+            <a:fillRect/>
+          </a:stretch>
+        </p:blipFill>
+        <p:spPr>
+          <a:xfrm>
+            <a:off x="233457" y="2323505"/>
+            <a:ext cx="5567268" cy="4169704"/>
+          </a:xfrm>
+          <a:prstGeom prst="rect">
+            <a:avLst/>
+          </a:prstGeom>
+        </p:spPr>
+      </p:pic>
+      <p:pic>
+        <p:nvPicPr>
+          <p:cNvPr id="5" name="Kép 4">
+            <a:extLst>
+              <a:ext uri="{FF2B5EF4-FFF2-40B4-BE49-F238E27FC236}">
+                <a16:creationId xmlns:a16="http://schemas.microsoft.com/office/drawing/2014/main" id="{9FB0BE35-F040-E11F-5944-E74DB47B5F49}"/>
+              </a:ext>
+            </a:extLst>
+          </p:cNvPr>
+          <p:cNvPicPr>
+            <a:picLocks noChangeAspect="1"/>
+          </p:cNvPicPr>
+          <p:nvPr/>
+        </p:nvPicPr>
+        <p:blipFill>
+          <a:blip r:embed="rId4">
+            <a:extLst>
+              <a:ext uri="{28A0092B-C50C-407E-A947-70E740481C1C}">
+                <a14:useLocalDpi xmlns:a14="http://schemas.microsoft.com/office/drawing/2010/main" val="0"/>
+              </a:ext>
+            </a:extLst>
+          </a:blip>
+          <a:stretch>
+            <a:fillRect/>
+          </a:stretch>
+        </p:blipFill>
+        <p:spPr>
+          <a:xfrm>
+            <a:off x="5924550" y="2323505"/>
+            <a:ext cx="5875524" cy="4194248"/>
+          </a:xfrm>
+          <a:prstGeom prst="rect">
+            <a:avLst/>
+          </a:prstGeom>
+        </p:spPr>
+      </p:pic>
+      <p:sp>
+        <p:nvSpPr>
+          <p:cNvPr id="7" name="Szövegdoboz 6">
+            <a:extLst>
+              <a:ext uri="{FF2B5EF4-FFF2-40B4-BE49-F238E27FC236}">
+                <a16:creationId xmlns:a16="http://schemas.microsoft.com/office/drawing/2014/main" id="{4DED6BF7-C0A5-4882-9EC9-CECCF1D9F86D}"/>
+              </a:ext>
+            </a:extLst>
+          </p:cNvPr>
+          <p:cNvSpPr txBox="1"/>
+          <p:nvPr/>
+        </p:nvSpPr>
+        <p:spPr>
+          <a:xfrm>
+            <a:off x="1143000" y="1152261"/>
+            <a:ext cx="10815543" cy="830997"/>
+          </a:xfrm>
+          <a:prstGeom prst="rect">
+            <a:avLst/>
+          </a:prstGeom>
+          <a:noFill/>
+        </p:spPr>
+        <p:txBody>
+          <a:bodyPr wrap="square" rtlCol="0">
+            <a:spAutoFit/>
+          </a:bodyPr>
+          <a:lstStyle/>
+          <a:p>
+            <a:pPr marL="342900" indent="-342900">
+              <a:buFont typeface="Arial" panose="020B0604020202020204" pitchFamily="34" charset="0"/>
+              <a:buChar char="•"/>
+            </a:pPr>
+            <a:r>
+              <a:rPr lang="hu-HU" sz="2400" b="0" i="0" dirty="0">
+                <a:solidFill>
+                  <a:srgbClr val="FFFF00"/>
+                </a:solidFill>
+                <a:effectLst/>
+                <a:latin typeface="Impact" panose="020B0806030902050204" pitchFamily="34" charset="0"/>
+              </a:rPr>
+              <a:t>A reszponzív design a legkényelmesebb és legteljesebb felhasználói élményt biztosítja a látogatóknak, bármilyen eszközön böngészik weboldaladon</a:t>
+            </a:r>
+            <a:endParaRPr lang="hu-HU" sz="2400" dirty="0">
+              <a:solidFill>
+                <a:srgbClr val="FFFF00"/>
+              </a:solidFill>
+              <a:latin typeface="Impact" panose="020B0806030902050204" pitchFamily="34" charset="0"/>
+            </a:endParaRPr>
+          </a:p>
+        </p:txBody>
+      </p:sp>
     </p:spTree>
     <p:extLst>
       <p:ext uri="{BB962C8B-B14F-4D97-AF65-F5344CB8AC3E}">
-        <p14:creationId xmlns:p14="http://schemas.microsoft.com/office/powerpoint/2010/main" val="3490480153"/>
+        <p14:creationId xmlns:p14="http://schemas.microsoft.com/office/powerpoint/2010/main" val="3425398856"/>
       </p:ext>
     </p:extLst>
   </p:cSld>
@@ -3961,10 +4879,1547 @@
           </a:extLst>
         </p:spPr>
       </p:pic>
+      <p:sp>
+        <p:nvSpPr>
+          <p:cNvPr id="2" name="Szövegdoboz 1">
+            <a:extLst>
+              <a:ext uri="{FF2B5EF4-FFF2-40B4-BE49-F238E27FC236}">
+                <a16:creationId xmlns:a16="http://schemas.microsoft.com/office/drawing/2014/main" id="{03D1C8E6-E711-48BF-A058-4091BFE0E6A5}"/>
+              </a:ext>
+            </a:extLst>
+          </p:cNvPr>
+          <p:cNvSpPr txBox="1"/>
+          <p:nvPr/>
+        </p:nvSpPr>
+        <p:spPr>
+          <a:xfrm>
+            <a:off x="762000" y="523101"/>
+            <a:ext cx="6553200" cy="646331"/>
+          </a:xfrm>
+          <a:prstGeom prst="rect">
+            <a:avLst/>
+          </a:prstGeom>
+          <a:noFill/>
+        </p:spPr>
+        <p:txBody>
+          <a:bodyPr wrap="square" rtlCol="0">
+            <a:spAutoFit/>
+          </a:bodyPr>
+          <a:lstStyle/>
+          <a:p>
+            <a:r>
+              <a:rPr lang="hu-HU" sz="3600" dirty="0">
+                <a:solidFill>
+                  <a:srgbClr val="FFFF00"/>
+                </a:solidFill>
+                <a:latin typeface="Impact" panose="020B0806030902050204" pitchFamily="34" charset="0"/>
+              </a:rPr>
+              <a:t>Tesztelés</a:t>
+            </a:r>
+          </a:p>
+        </p:txBody>
+      </p:sp>
+      <p:pic>
+        <p:nvPicPr>
+          <p:cNvPr id="4" name="Kép 3">
+            <a:extLst>
+              <a:ext uri="{FF2B5EF4-FFF2-40B4-BE49-F238E27FC236}">
+                <a16:creationId xmlns:a16="http://schemas.microsoft.com/office/drawing/2014/main" id="{AD19553C-0E35-0EE7-F427-A32F5CB7448F}"/>
+              </a:ext>
+            </a:extLst>
+          </p:cNvPr>
+          <p:cNvPicPr>
+            <a:picLocks noChangeAspect="1"/>
+          </p:cNvPicPr>
+          <p:nvPr/>
+        </p:nvPicPr>
+        <p:blipFill>
+          <a:blip r:embed="rId3">
+            <a:extLst>
+              <a:ext uri="{28A0092B-C50C-407E-A947-70E740481C1C}">
+                <a14:useLocalDpi xmlns:a14="http://schemas.microsoft.com/office/drawing/2010/main" val="0"/>
+              </a:ext>
+            </a:extLst>
+          </a:blip>
+          <a:stretch>
+            <a:fillRect/>
+          </a:stretch>
+        </p:blipFill>
+        <p:spPr>
+          <a:xfrm>
+            <a:off x="-1" y="1690026"/>
+            <a:ext cx="12192000" cy="3008415"/>
+          </a:xfrm>
+          <a:prstGeom prst="rect">
+            <a:avLst/>
+          </a:prstGeom>
+        </p:spPr>
+      </p:pic>
     </p:spTree>
     <p:extLst>
       <p:ext uri="{BB962C8B-B14F-4D97-AF65-F5344CB8AC3E}">
-        <p14:creationId xmlns:p14="http://schemas.microsoft.com/office/powerpoint/2010/main" val="312192995"/>
+        <p14:creationId xmlns:p14="http://schemas.microsoft.com/office/powerpoint/2010/main" val="1039904608"/>
+      </p:ext>
+    </p:extLst>
+  </p:cSld>
+  <p:clrMapOvr>
+    <a:masterClrMapping/>
+  </p:clrMapOvr>
+</p:sld>
+</file>
+
+<file path=ppt/slides/slide16.xml><?xml version="1.0" encoding="utf-8"?>
+<p:sld xmlns:a="http://schemas.openxmlformats.org/drawingml/2006/main" xmlns:r="http://schemas.openxmlformats.org/officeDocument/2006/relationships" xmlns:p="http://schemas.openxmlformats.org/presentationml/2006/main">
+  <p:cSld>
+    <p:spTree>
+      <p:nvGrpSpPr>
+        <p:cNvPr id="1" name=""/>
+        <p:cNvGrpSpPr/>
+        <p:nvPr/>
+      </p:nvGrpSpPr>
+      <p:grpSpPr>
+        <a:xfrm>
+          <a:off x="0" y="0"/>
+          <a:ext cx="0" cy="0"/>
+          <a:chOff x="0" y="0"/>
+          <a:chExt cx="0" cy="0"/>
+        </a:xfrm>
+      </p:grpSpPr>
+      <p:pic>
+        <p:nvPicPr>
+          <p:cNvPr id="1026" name="Picture 2" descr="money Archívum - Ingyenes Angol online nyelvtanulás minden nap">
+            <a:extLst>
+              <a:ext uri="{FF2B5EF4-FFF2-40B4-BE49-F238E27FC236}">
+                <a16:creationId xmlns:a16="http://schemas.microsoft.com/office/drawing/2014/main" id="{845EFDA4-AED0-4EDB-A315-AF405F7561D8}"/>
+              </a:ext>
+            </a:extLst>
+          </p:cNvPr>
+          <p:cNvPicPr>
+            <a:picLocks noChangeAspect="1" noChangeArrowheads="1"/>
+          </p:cNvPicPr>
+          <p:nvPr/>
+        </p:nvPicPr>
+        <p:blipFill>
+          <a:blip r:embed="rId2">
+            <a:extLst>
+              <a:ext uri="{28A0092B-C50C-407E-A947-70E740481C1C}">
+                <a14:useLocalDpi xmlns:a14="http://schemas.microsoft.com/office/drawing/2010/main" val="0"/>
+              </a:ext>
+            </a:extLst>
+          </a:blip>
+          <a:srcRect/>
+          <a:stretch>
+            <a:fillRect/>
+          </a:stretch>
+        </p:blipFill>
+        <p:spPr bwMode="auto">
+          <a:xfrm>
+            <a:off x="1" y="2507"/>
+            <a:ext cx="12192000" cy="6855493"/>
+          </a:xfrm>
+          <a:prstGeom prst="rect">
+            <a:avLst/>
+          </a:prstGeom>
+          <a:noFill/>
+          <a:extLst>
+            <a:ext uri="{909E8E84-426E-40DD-AFC4-6F175D3DCCD1}">
+              <a14:hiddenFill xmlns:a14="http://schemas.microsoft.com/office/drawing/2010/main">
+                <a:solidFill>
+                  <a:srgbClr val="FFFFFF"/>
+                </a:solidFill>
+              </a14:hiddenFill>
+            </a:ext>
+          </a:extLst>
+        </p:spPr>
+      </p:pic>
+      <p:sp>
+        <p:nvSpPr>
+          <p:cNvPr id="2" name="Szövegdoboz 1">
+            <a:extLst>
+              <a:ext uri="{FF2B5EF4-FFF2-40B4-BE49-F238E27FC236}">
+                <a16:creationId xmlns:a16="http://schemas.microsoft.com/office/drawing/2014/main" id="{03D1C8E6-E711-48BF-A058-4091BFE0E6A5}"/>
+              </a:ext>
+            </a:extLst>
+          </p:cNvPr>
+          <p:cNvSpPr txBox="1"/>
+          <p:nvPr/>
+        </p:nvSpPr>
+        <p:spPr>
+          <a:xfrm>
+            <a:off x="762000" y="535940"/>
+            <a:ext cx="9715500" cy="646331"/>
+          </a:xfrm>
+          <a:prstGeom prst="rect">
+            <a:avLst/>
+          </a:prstGeom>
+          <a:noFill/>
+        </p:spPr>
+        <p:txBody>
+          <a:bodyPr wrap="square" rtlCol="0">
+            <a:spAutoFit/>
+          </a:bodyPr>
+          <a:lstStyle/>
+          <a:p>
+            <a:r>
+              <a:rPr lang="hu-HU" sz="3600" dirty="0">
+                <a:solidFill>
+                  <a:srgbClr val="FFFF00"/>
+                </a:solidFill>
+                <a:latin typeface="Impact" panose="020B0806030902050204" pitchFamily="34" charset="0"/>
+              </a:rPr>
+              <a:t>Útvonalak, és leírás néhány végpontról </a:t>
+            </a:r>
+          </a:p>
+        </p:txBody>
+      </p:sp>
+      <p:graphicFrame>
+        <p:nvGraphicFramePr>
+          <p:cNvPr id="6" name="Táblázat 6">
+            <a:extLst>
+              <a:ext uri="{FF2B5EF4-FFF2-40B4-BE49-F238E27FC236}">
+                <a16:creationId xmlns:a16="http://schemas.microsoft.com/office/drawing/2014/main" id="{0DEDC2F0-A57C-C6BC-E8E2-4D977BAB61B4}"/>
+              </a:ext>
+            </a:extLst>
+          </p:cNvPr>
+          <p:cNvGraphicFramePr>
+            <a:graphicFrameLocks noGrp="1"/>
+          </p:cNvGraphicFramePr>
+          <p:nvPr>
+            <p:extLst>
+              <p:ext uri="{D42A27DB-BD31-4B8C-83A1-F6EECF244321}">
+                <p14:modId xmlns:p14="http://schemas.microsoft.com/office/powerpoint/2010/main" val="482158789"/>
+              </p:ext>
+            </p:extLst>
+          </p:nvPr>
+        </p:nvGraphicFramePr>
+        <p:xfrm>
+          <a:off x="762000" y="1715704"/>
+          <a:ext cx="10972801" cy="3207880"/>
+        </p:xfrm>
+        <a:graphic>
+          <a:graphicData uri="http://schemas.openxmlformats.org/drawingml/2006/table">
+            <a:tbl>
+              <a:tblPr firstRow="1" bandRow="1">
+                <a:tableStyleId>{5C22544A-7EE6-4342-B048-85BDC9FD1C3A}</a:tableStyleId>
+              </a:tblPr>
+              <a:tblGrid>
+                <a:gridCol w="3744897">
+                  <a:extLst>
+                    <a:ext uri="{9D8B030D-6E8A-4147-A177-3AD203B41FA5}">
+                      <a16:colId xmlns:a16="http://schemas.microsoft.com/office/drawing/2014/main" val="4175673245"/>
+                    </a:ext>
+                  </a:extLst>
+                </a:gridCol>
+                <a:gridCol w="2129492">
+                  <a:extLst>
+                    <a:ext uri="{9D8B030D-6E8A-4147-A177-3AD203B41FA5}">
+                      <a16:colId xmlns:a16="http://schemas.microsoft.com/office/drawing/2014/main" val="2087133718"/>
+                    </a:ext>
+                  </a:extLst>
+                </a:gridCol>
+                <a:gridCol w="5098412">
+                  <a:extLst>
+                    <a:ext uri="{9D8B030D-6E8A-4147-A177-3AD203B41FA5}">
+                      <a16:colId xmlns:a16="http://schemas.microsoft.com/office/drawing/2014/main" val="1132189384"/>
+                    </a:ext>
+                  </a:extLst>
+                </a:gridCol>
+              </a:tblGrid>
+              <a:tr h="370840">
+                <a:tc>
+                  <a:txBody>
+                    <a:bodyPr/>
+                    <a:lstStyle/>
+                    <a:p>
+                      <a:r>
+                        <a:rPr lang="hu-HU" sz="1800" dirty="0"/>
+                        <a:t>Végpontok</a:t>
+                      </a:r>
+                    </a:p>
+                  </a:txBody>
+                  <a:tcPr/>
+                </a:tc>
+                <a:tc>
+                  <a:txBody>
+                    <a:bodyPr/>
+                    <a:lstStyle/>
+                    <a:p>
+                      <a:r>
+                        <a:rPr lang="hu-HU" dirty="0"/>
+                        <a:t>Metódus</a:t>
+                      </a:r>
+                    </a:p>
+                  </a:txBody>
+                  <a:tcPr/>
+                </a:tc>
+                <a:tc>
+                  <a:txBody>
+                    <a:bodyPr/>
+                    <a:lstStyle/>
+                    <a:p>
+                      <a:r>
+                        <a:rPr lang="hu-HU" dirty="0"/>
+                        <a:t>Leírás</a:t>
+                      </a:r>
+                    </a:p>
+                  </a:txBody>
+                  <a:tcPr/>
+                </a:tc>
+                <a:extLst>
+                  <a:ext uri="{0D108BD9-81ED-4DB2-BD59-A6C34878D82A}">
+                    <a16:rowId xmlns:a16="http://schemas.microsoft.com/office/drawing/2014/main" val="4084937924"/>
+                  </a:ext>
+                </a:extLst>
+              </a:tr>
+              <a:tr h="612000">
+                <a:tc>
+                  <a:txBody>
+                    <a:bodyPr/>
+                    <a:lstStyle/>
+                    <a:p>
+                      <a:pPr marL="0" marR="0" lvl="0" indent="0" algn="l" defTabSz="914400" rtl="0" eaLnBrk="1" fontAlgn="auto" latinLnBrk="0" hangingPunct="1">
+                        <a:lnSpc>
+                          <a:spcPct val="100000"/>
+                        </a:lnSpc>
+                        <a:spcBef>
+                          <a:spcPts val="0"/>
+                        </a:spcBef>
+                        <a:spcAft>
+                          <a:spcPts val="0"/>
+                        </a:spcAft>
+                        <a:buClrTx/>
+                        <a:buSzTx/>
+                        <a:buFontTx/>
+                        <a:buNone/>
+                        <a:tabLst/>
+                        <a:defRPr/>
+                      </a:pPr>
+                      <a:r>
+                        <a:rPr lang="hu-HU" sz="1800" b="0" kern="1200" dirty="0">
+                          <a:solidFill>
+                            <a:schemeClr val="dk1"/>
+                          </a:solidFill>
+                          <a:effectLst/>
+                          <a:latin typeface="+mn-lt"/>
+                          <a:ea typeface="+mn-ea"/>
+                          <a:cs typeface="+mn-cs"/>
+                        </a:rPr>
+                        <a:t>/</a:t>
+                      </a:r>
+                      <a:r>
+                        <a:rPr lang="hu-HU" sz="1800" b="0" kern="1200" dirty="0" err="1">
+                          <a:solidFill>
+                            <a:schemeClr val="dk1"/>
+                          </a:solidFill>
+                          <a:effectLst/>
+                          <a:latin typeface="+mn-lt"/>
+                          <a:ea typeface="+mn-ea"/>
+                          <a:cs typeface="+mn-cs"/>
+                        </a:rPr>
+                        <a:t>incomes</a:t>
+                      </a:r>
+                      <a:endParaRPr lang="hu-HU" sz="1800" b="0" kern="1200" dirty="0">
+                        <a:solidFill>
+                          <a:schemeClr val="dk1"/>
+                        </a:solidFill>
+                        <a:effectLst/>
+                        <a:latin typeface="+mn-lt"/>
+                        <a:ea typeface="+mn-ea"/>
+                        <a:cs typeface="+mn-cs"/>
+                      </a:endParaRPr>
+                    </a:p>
+                  </a:txBody>
+                  <a:tcPr anchor="ctr"/>
+                </a:tc>
+                <a:tc>
+                  <a:txBody>
+                    <a:bodyPr/>
+                    <a:lstStyle/>
+                    <a:p>
+                      <a:r>
+                        <a:rPr lang="hu-HU" sz="1800" dirty="0" err="1"/>
+                        <a:t>get</a:t>
+                      </a:r>
+                      <a:endParaRPr lang="hu-HU" sz="1800" dirty="0"/>
+                    </a:p>
+                  </a:txBody>
+                  <a:tcPr anchor="ctr"/>
+                </a:tc>
+                <a:tc>
+                  <a:txBody>
+                    <a:bodyPr/>
+                    <a:lstStyle/>
+                    <a:p>
+                      <a:r>
+                        <a:rPr lang="hu-HU" sz="1800" dirty="0"/>
+                        <a:t>Megjeleníti a bevételeket</a:t>
+                      </a:r>
+                    </a:p>
+                  </a:txBody>
+                  <a:tcPr anchor="ctr"/>
+                </a:tc>
+                <a:extLst>
+                  <a:ext uri="{0D108BD9-81ED-4DB2-BD59-A6C34878D82A}">
+                    <a16:rowId xmlns:a16="http://schemas.microsoft.com/office/drawing/2014/main" val="2744653510"/>
+                  </a:ext>
+                </a:extLst>
+              </a:tr>
+              <a:tr h="370840">
+                <a:tc>
+                  <a:txBody>
+                    <a:bodyPr/>
+                    <a:lstStyle/>
+                    <a:p>
+                      <a:pPr marL="0" marR="0" lvl="0" indent="0" algn="l" defTabSz="914400" rtl="0" eaLnBrk="1" fontAlgn="auto" latinLnBrk="0" hangingPunct="1">
+                        <a:lnSpc>
+                          <a:spcPct val="100000"/>
+                        </a:lnSpc>
+                        <a:spcBef>
+                          <a:spcPts val="0"/>
+                        </a:spcBef>
+                        <a:spcAft>
+                          <a:spcPts val="0"/>
+                        </a:spcAft>
+                        <a:buClrTx/>
+                        <a:buSzTx/>
+                        <a:buFontTx/>
+                        <a:buNone/>
+                        <a:tabLst/>
+                        <a:defRPr/>
+                      </a:pPr>
+                      <a:r>
+                        <a:rPr lang="hu-HU" sz="1800" dirty="0"/>
+                        <a:t>/</a:t>
+                      </a:r>
+                      <a:r>
+                        <a:rPr lang="hu-HU" sz="1800" dirty="0" err="1"/>
+                        <a:t>incomes</a:t>
+                      </a:r>
+                      <a:r>
+                        <a:rPr lang="hu-HU" sz="1800" dirty="0"/>
+                        <a:t>/</a:t>
+                      </a:r>
+                      <a:r>
+                        <a:rPr lang="hu-HU" sz="1800" dirty="0" err="1"/>
+                        <a:t>create</a:t>
+                      </a:r>
+                      <a:endParaRPr lang="hu-HU" sz="1800" b="0" kern="1200" dirty="0">
+                        <a:solidFill>
+                          <a:schemeClr val="dk1"/>
+                        </a:solidFill>
+                        <a:effectLst/>
+                        <a:latin typeface="+mn-lt"/>
+                        <a:ea typeface="+mn-ea"/>
+                        <a:cs typeface="+mn-cs"/>
+                      </a:endParaRPr>
+                    </a:p>
+                  </a:txBody>
+                  <a:tcPr anchor="ctr"/>
+                </a:tc>
+                <a:tc>
+                  <a:txBody>
+                    <a:bodyPr/>
+                    <a:lstStyle/>
+                    <a:p>
+                      <a:r>
+                        <a:rPr lang="hu-HU" dirty="0" err="1"/>
+                        <a:t>get</a:t>
+                      </a:r>
+                      <a:endParaRPr lang="hu-HU" dirty="0"/>
+                    </a:p>
+                  </a:txBody>
+                  <a:tcPr/>
+                </a:tc>
+                <a:tc>
+                  <a:txBody>
+                    <a:bodyPr/>
+                    <a:lstStyle/>
+                    <a:p>
+                      <a:r>
+                        <a:rPr lang="hu-HU" dirty="0"/>
+                        <a:t>Bevételt lehet vele létrehozni</a:t>
+                      </a:r>
+                    </a:p>
+                  </a:txBody>
+                  <a:tcPr/>
+                </a:tc>
+                <a:extLst>
+                  <a:ext uri="{0D108BD9-81ED-4DB2-BD59-A6C34878D82A}">
+                    <a16:rowId xmlns:a16="http://schemas.microsoft.com/office/drawing/2014/main" val="1046900178"/>
+                  </a:ext>
+                </a:extLst>
+              </a:tr>
+              <a:tr h="370840">
+                <a:tc>
+                  <a:txBody>
+                    <a:bodyPr/>
+                    <a:lstStyle/>
+                    <a:p>
+                      <a:pPr marL="0" marR="0" lvl="0" indent="0" algn="l" defTabSz="914400" rtl="0" eaLnBrk="1" fontAlgn="auto" latinLnBrk="0" hangingPunct="1">
+                        <a:lnSpc>
+                          <a:spcPct val="100000"/>
+                        </a:lnSpc>
+                        <a:spcBef>
+                          <a:spcPts val="0"/>
+                        </a:spcBef>
+                        <a:spcAft>
+                          <a:spcPts val="0"/>
+                        </a:spcAft>
+                        <a:buClrTx/>
+                        <a:buSzTx/>
+                        <a:buFontTx/>
+                        <a:buNone/>
+                        <a:tabLst/>
+                        <a:defRPr/>
+                      </a:pPr>
+                      <a:r>
+                        <a:rPr lang="hu-HU" sz="1800" dirty="0"/>
+                        <a:t>/</a:t>
+                      </a:r>
+                      <a:r>
+                        <a:rPr lang="hu-HU" sz="1800" dirty="0" err="1"/>
+                        <a:t>incomes</a:t>
+                      </a:r>
+                      <a:r>
+                        <a:rPr lang="hu-HU" sz="1800" dirty="0"/>
+                        <a:t>/</a:t>
+                      </a:r>
+                      <a:r>
+                        <a:rPr lang="hu-HU" sz="1800" dirty="0" err="1"/>
+                        <a:t>store</a:t>
+                      </a:r>
+                      <a:endParaRPr lang="hu-HU" sz="1800" b="0" kern="1200" dirty="0">
+                        <a:solidFill>
+                          <a:schemeClr val="dk1"/>
+                        </a:solidFill>
+                        <a:effectLst/>
+                        <a:latin typeface="+mn-lt"/>
+                        <a:ea typeface="+mn-ea"/>
+                        <a:cs typeface="+mn-cs"/>
+                      </a:endParaRPr>
+                    </a:p>
+                  </a:txBody>
+                  <a:tcPr/>
+                </a:tc>
+                <a:tc>
+                  <a:txBody>
+                    <a:bodyPr/>
+                    <a:lstStyle/>
+                    <a:p>
+                      <a:r>
+                        <a:rPr lang="hu-HU" dirty="0"/>
+                        <a:t>post</a:t>
+                      </a:r>
+                    </a:p>
+                  </a:txBody>
+                  <a:tcPr/>
+                </a:tc>
+                <a:tc>
+                  <a:txBody>
+                    <a:bodyPr/>
+                    <a:lstStyle/>
+                    <a:p>
+                      <a:r>
+                        <a:rPr lang="hu-HU" dirty="0"/>
+                        <a:t>Eltárolja a megadott értékeket</a:t>
+                      </a:r>
+                    </a:p>
+                  </a:txBody>
+                  <a:tcPr/>
+                </a:tc>
+                <a:extLst>
+                  <a:ext uri="{0D108BD9-81ED-4DB2-BD59-A6C34878D82A}">
+                    <a16:rowId xmlns:a16="http://schemas.microsoft.com/office/drawing/2014/main" val="702758884"/>
+                  </a:ext>
+                </a:extLst>
+              </a:tr>
+              <a:tr h="370840">
+                <a:tc>
+                  <a:txBody>
+                    <a:bodyPr/>
+                    <a:lstStyle/>
+                    <a:p>
+                      <a:pPr marL="0" marR="0" lvl="0" indent="0" algn="l" defTabSz="914400" rtl="0" eaLnBrk="1" fontAlgn="auto" latinLnBrk="0" hangingPunct="1">
+                        <a:lnSpc>
+                          <a:spcPct val="100000"/>
+                        </a:lnSpc>
+                        <a:spcBef>
+                          <a:spcPts val="0"/>
+                        </a:spcBef>
+                        <a:spcAft>
+                          <a:spcPts val="0"/>
+                        </a:spcAft>
+                        <a:buClrTx/>
+                        <a:buSzTx/>
+                        <a:buFontTx/>
+                        <a:buNone/>
+                        <a:tabLst/>
+                        <a:defRPr/>
+                      </a:pPr>
+                      <a:r>
+                        <a:rPr lang="hu-HU" sz="1800" dirty="0"/>
+                        <a:t>/</a:t>
+                      </a:r>
+                      <a:r>
+                        <a:rPr lang="hu-HU" sz="1800" dirty="0" err="1"/>
+                        <a:t>incomes</a:t>
+                      </a:r>
+                      <a:r>
+                        <a:rPr lang="hu-HU" sz="1800" dirty="0"/>
+                        <a:t>/</a:t>
+                      </a:r>
+                      <a:r>
+                        <a:rPr lang="hu-HU" sz="1800" dirty="0" err="1"/>
+                        <a:t>edit</a:t>
+                      </a:r>
+                      <a:r>
+                        <a:rPr lang="hu-HU" sz="1800" dirty="0"/>
+                        <a:t>/{</a:t>
+                      </a:r>
+                      <a:r>
+                        <a:rPr lang="hu-HU" sz="1800" dirty="0" err="1"/>
+                        <a:t>id</a:t>
+                      </a:r>
+                      <a:r>
+                        <a:rPr lang="hu-HU" sz="1800" dirty="0"/>
+                        <a:t>}</a:t>
+                      </a:r>
+                      <a:r>
+                        <a:rPr lang="hu-HU" sz="1800" b="0" kern="1200" dirty="0">
+                          <a:solidFill>
+                            <a:schemeClr val="dk1"/>
+                          </a:solidFill>
+                          <a:effectLst/>
+                          <a:latin typeface="+mn-lt"/>
+                          <a:ea typeface="+mn-ea"/>
+                          <a:cs typeface="+mn-cs"/>
+                        </a:rPr>
+                        <a:t> </a:t>
+                      </a:r>
+                    </a:p>
+                  </a:txBody>
+                  <a:tcPr/>
+                </a:tc>
+                <a:tc>
+                  <a:txBody>
+                    <a:bodyPr/>
+                    <a:lstStyle/>
+                    <a:p>
+                      <a:r>
+                        <a:rPr lang="hu-HU" dirty="0" err="1"/>
+                        <a:t>get</a:t>
+                      </a:r>
+                      <a:endParaRPr lang="hu-HU" dirty="0"/>
+                    </a:p>
+                  </a:txBody>
+                  <a:tcPr/>
+                </a:tc>
+                <a:tc>
+                  <a:txBody>
+                    <a:bodyPr/>
+                    <a:lstStyle/>
+                    <a:p>
+                      <a:r>
+                        <a:rPr lang="hu-HU" dirty="0"/>
+                        <a:t>Azonosító alapján módosítja a megadott értéket</a:t>
+                      </a:r>
+                    </a:p>
+                  </a:txBody>
+                  <a:tcPr/>
+                </a:tc>
+                <a:extLst>
+                  <a:ext uri="{0D108BD9-81ED-4DB2-BD59-A6C34878D82A}">
+                    <a16:rowId xmlns:a16="http://schemas.microsoft.com/office/drawing/2014/main" val="454665448"/>
+                  </a:ext>
+                </a:extLst>
+              </a:tr>
+              <a:tr h="370840">
+                <a:tc>
+                  <a:txBody>
+                    <a:bodyPr/>
+                    <a:lstStyle/>
+                    <a:p>
+                      <a:pPr marL="0" marR="0" lvl="0" indent="0" algn="l" defTabSz="914400" rtl="0" eaLnBrk="1" fontAlgn="auto" latinLnBrk="0" hangingPunct="1">
+                        <a:lnSpc>
+                          <a:spcPct val="100000"/>
+                        </a:lnSpc>
+                        <a:spcBef>
+                          <a:spcPts val="0"/>
+                        </a:spcBef>
+                        <a:spcAft>
+                          <a:spcPts val="0"/>
+                        </a:spcAft>
+                        <a:buClrTx/>
+                        <a:buSzTx/>
+                        <a:buFontTx/>
+                        <a:buNone/>
+                        <a:tabLst/>
+                        <a:defRPr/>
+                      </a:pPr>
+                      <a:r>
+                        <a:rPr lang="hu-HU" sz="1800" dirty="0"/>
+                        <a:t>/</a:t>
+                      </a:r>
+                      <a:r>
+                        <a:rPr lang="hu-HU" sz="1800" dirty="0" err="1"/>
+                        <a:t>incomes</a:t>
+                      </a:r>
+                      <a:r>
+                        <a:rPr lang="hu-HU" sz="1800" dirty="0"/>
+                        <a:t>/update</a:t>
+                      </a:r>
+                      <a:endParaRPr lang="hu-HU" sz="1800" b="0" kern="1200" dirty="0">
+                        <a:solidFill>
+                          <a:schemeClr val="dk1"/>
+                        </a:solidFill>
+                        <a:effectLst/>
+                        <a:latin typeface="+mn-lt"/>
+                        <a:ea typeface="+mn-ea"/>
+                        <a:cs typeface="+mn-cs"/>
+                      </a:endParaRPr>
+                    </a:p>
+                  </a:txBody>
+                  <a:tcPr/>
+                </a:tc>
+                <a:tc>
+                  <a:txBody>
+                    <a:bodyPr/>
+                    <a:lstStyle/>
+                    <a:p>
+                      <a:r>
+                        <a:rPr lang="hu-HU" dirty="0"/>
+                        <a:t>post</a:t>
+                      </a:r>
+                    </a:p>
+                  </a:txBody>
+                  <a:tcPr/>
+                </a:tc>
+                <a:tc>
+                  <a:txBody>
+                    <a:bodyPr/>
+                    <a:lstStyle/>
+                    <a:p>
+                      <a:r>
+                        <a:rPr lang="hu-HU" dirty="0"/>
+                        <a:t>Frissíti a módosított értékeket</a:t>
+                      </a:r>
+                    </a:p>
+                  </a:txBody>
+                  <a:tcPr/>
+                </a:tc>
+                <a:extLst>
+                  <a:ext uri="{0D108BD9-81ED-4DB2-BD59-A6C34878D82A}">
+                    <a16:rowId xmlns:a16="http://schemas.microsoft.com/office/drawing/2014/main" val="3467108754"/>
+                  </a:ext>
+                </a:extLst>
+              </a:tr>
+              <a:tr h="370840">
+                <a:tc>
+                  <a:txBody>
+                    <a:bodyPr/>
+                    <a:lstStyle/>
+                    <a:p>
+                      <a:pPr marL="0" marR="0" lvl="0" indent="0" algn="l" defTabSz="914400" rtl="0" eaLnBrk="1" fontAlgn="auto" latinLnBrk="0" hangingPunct="1">
+                        <a:lnSpc>
+                          <a:spcPct val="100000"/>
+                        </a:lnSpc>
+                        <a:spcBef>
+                          <a:spcPts val="0"/>
+                        </a:spcBef>
+                        <a:spcAft>
+                          <a:spcPts val="0"/>
+                        </a:spcAft>
+                        <a:buClrTx/>
+                        <a:buSzTx/>
+                        <a:buFontTx/>
+                        <a:buNone/>
+                        <a:tabLst/>
+                        <a:defRPr/>
+                      </a:pPr>
+                      <a:r>
+                        <a:rPr lang="hu-HU" sz="1800" dirty="0"/>
+                        <a:t>/</a:t>
+                      </a:r>
+                      <a:r>
+                        <a:rPr lang="hu-HU" sz="1800" dirty="0" err="1"/>
+                        <a:t>incomes</a:t>
+                      </a:r>
+                      <a:r>
+                        <a:rPr lang="hu-HU" sz="1800" dirty="0"/>
+                        <a:t>/</a:t>
+                      </a:r>
+                      <a:r>
+                        <a:rPr lang="hu-HU" sz="1800" dirty="0" err="1"/>
+                        <a:t>delete</a:t>
+                      </a:r>
+                      <a:r>
+                        <a:rPr lang="hu-HU" sz="1800" dirty="0"/>
+                        <a:t>/{</a:t>
+                      </a:r>
+                      <a:r>
+                        <a:rPr lang="hu-HU" sz="1800" dirty="0" err="1"/>
+                        <a:t>id</a:t>
+                      </a:r>
+                      <a:r>
+                        <a:rPr lang="hu-HU" sz="1800" dirty="0"/>
+                        <a:t>}</a:t>
+                      </a:r>
+                      <a:endParaRPr lang="hu-HU" sz="1800" b="0" kern="1200" dirty="0">
+                        <a:solidFill>
+                          <a:schemeClr val="dk1"/>
+                        </a:solidFill>
+                        <a:effectLst/>
+                        <a:latin typeface="+mn-lt"/>
+                        <a:ea typeface="+mn-ea"/>
+                        <a:cs typeface="+mn-cs"/>
+                      </a:endParaRPr>
+                    </a:p>
+                  </a:txBody>
+                  <a:tcPr/>
+                </a:tc>
+                <a:tc>
+                  <a:txBody>
+                    <a:bodyPr/>
+                    <a:lstStyle/>
+                    <a:p>
+                      <a:r>
+                        <a:rPr lang="hu-HU" dirty="0" err="1"/>
+                        <a:t>get</a:t>
+                      </a:r>
+                      <a:endParaRPr lang="hu-HU" dirty="0"/>
+                    </a:p>
+                  </a:txBody>
+                  <a:tcPr/>
+                </a:tc>
+                <a:tc>
+                  <a:txBody>
+                    <a:bodyPr/>
+                    <a:lstStyle/>
+                    <a:p>
+                      <a:r>
+                        <a:rPr lang="hu-HU" dirty="0"/>
+                        <a:t>Azonosító alapján törli a megadott értéket</a:t>
+                      </a:r>
+                    </a:p>
+                  </a:txBody>
+                  <a:tcPr/>
+                </a:tc>
+                <a:extLst>
+                  <a:ext uri="{0D108BD9-81ED-4DB2-BD59-A6C34878D82A}">
+                    <a16:rowId xmlns:a16="http://schemas.microsoft.com/office/drawing/2014/main" val="2649629841"/>
+                  </a:ext>
+                </a:extLst>
+              </a:tr>
+              <a:tr h="370840">
+                <a:tc>
+                  <a:txBody>
+                    <a:bodyPr/>
+                    <a:lstStyle/>
+                    <a:p>
+                      <a:pPr marL="0" marR="0" lvl="0" indent="0" algn="l" defTabSz="914400" rtl="0" eaLnBrk="1" fontAlgn="auto" latinLnBrk="0" hangingPunct="1">
+                        <a:lnSpc>
+                          <a:spcPct val="100000"/>
+                        </a:lnSpc>
+                        <a:spcBef>
+                          <a:spcPts val="0"/>
+                        </a:spcBef>
+                        <a:spcAft>
+                          <a:spcPts val="0"/>
+                        </a:spcAft>
+                        <a:buClrTx/>
+                        <a:buSzTx/>
+                        <a:buFontTx/>
+                        <a:buNone/>
+                        <a:tabLst/>
+                        <a:defRPr/>
+                      </a:pPr>
+                      <a:r>
+                        <a:rPr lang="hu-HU" dirty="0"/>
+                        <a:t>/index</a:t>
+                      </a:r>
+                      <a:endParaRPr lang="hu-HU" sz="1800" b="0" kern="1200" dirty="0">
+                        <a:solidFill>
+                          <a:schemeClr val="dk1"/>
+                        </a:solidFill>
+                        <a:effectLst/>
+                        <a:latin typeface="+mn-lt"/>
+                        <a:ea typeface="+mn-ea"/>
+                        <a:cs typeface="+mn-cs"/>
+                      </a:endParaRPr>
+                    </a:p>
+                  </a:txBody>
+                  <a:tcPr/>
+                </a:tc>
+                <a:tc>
+                  <a:txBody>
+                    <a:bodyPr/>
+                    <a:lstStyle/>
+                    <a:p>
+                      <a:r>
+                        <a:rPr lang="hu-HU" dirty="0" err="1"/>
+                        <a:t>get</a:t>
+                      </a:r>
+                      <a:endParaRPr lang="hu-HU" dirty="0"/>
+                    </a:p>
+                  </a:txBody>
+                  <a:tcPr/>
+                </a:tc>
+                <a:tc>
+                  <a:txBody>
+                    <a:bodyPr/>
+                    <a:lstStyle/>
+                    <a:p>
+                      <a:r>
+                        <a:rPr lang="hu-HU" dirty="0"/>
+                        <a:t>Megjeleníti az irányítópult adatait</a:t>
+                      </a:r>
+                    </a:p>
+                  </a:txBody>
+                  <a:tcPr/>
+                </a:tc>
+                <a:extLst>
+                  <a:ext uri="{0D108BD9-81ED-4DB2-BD59-A6C34878D82A}">
+                    <a16:rowId xmlns:a16="http://schemas.microsoft.com/office/drawing/2014/main" val="1990718517"/>
+                  </a:ext>
+                </a:extLst>
+              </a:tr>
+            </a:tbl>
+          </a:graphicData>
+        </a:graphic>
+      </p:graphicFrame>
+    </p:spTree>
+    <p:extLst>
+      <p:ext uri="{BB962C8B-B14F-4D97-AF65-F5344CB8AC3E}">
+        <p14:creationId xmlns:p14="http://schemas.microsoft.com/office/powerpoint/2010/main" val="1106701989"/>
+      </p:ext>
+    </p:extLst>
+  </p:cSld>
+  <p:clrMapOvr>
+    <a:masterClrMapping/>
+  </p:clrMapOvr>
+</p:sld>
+</file>
+
+<file path=ppt/slides/slide17.xml><?xml version="1.0" encoding="utf-8"?>
+<p:sld xmlns:a="http://schemas.openxmlformats.org/drawingml/2006/main" xmlns:r="http://schemas.openxmlformats.org/officeDocument/2006/relationships" xmlns:p="http://schemas.openxmlformats.org/presentationml/2006/main">
+  <p:cSld>
+    <p:spTree>
+      <p:nvGrpSpPr>
+        <p:cNvPr id="1" name=""/>
+        <p:cNvGrpSpPr/>
+        <p:nvPr/>
+      </p:nvGrpSpPr>
+      <p:grpSpPr>
+        <a:xfrm>
+          <a:off x="0" y="0"/>
+          <a:ext cx="0" cy="0"/>
+          <a:chOff x="0" y="0"/>
+          <a:chExt cx="0" cy="0"/>
+        </a:xfrm>
+      </p:grpSpPr>
+      <p:pic>
+        <p:nvPicPr>
+          <p:cNvPr id="1026" name="Picture 2" descr="money Archívum - Ingyenes Angol online nyelvtanulás minden nap">
+            <a:extLst>
+              <a:ext uri="{FF2B5EF4-FFF2-40B4-BE49-F238E27FC236}">
+                <a16:creationId xmlns:a16="http://schemas.microsoft.com/office/drawing/2014/main" id="{845EFDA4-AED0-4EDB-A315-AF405F7561D8}"/>
+              </a:ext>
+            </a:extLst>
+          </p:cNvPr>
+          <p:cNvPicPr>
+            <a:picLocks noChangeAspect="1" noChangeArrowheads="1"/>
+          </p:cNvPicPr>
+          <p:nvPr/>
+        </p:nvPicPr>
+        <p:blipFill>
+          <a:blip r:embed="rId2">
+            <a:extLst>
+              <a:ext uri="{28A0092B-C50C-407E-A947-70E740481C1C}">
+                <a14:useLocalDpi xmlns:a14="http://schemas.microsoft.com/office/drawing/2010/main" val="0"/>
+              </a:ext>
+            </a:extLst>
+          </a:blip>
+          <a:srcRect/>
+          <a:stretch>
+            <a:fillRect/>
+          </a:stretch>
+        </p:blipFill>
+        <p:spPr bwMode="auto">
+          <a:xfrm>
+            <a:off x="0" y="2507"/>
+            <a:ext cx="12192000" cy="6855493"/>
+          </a:xfrm>
+          <a:prstGeom prst="rect">
+            <a:avLst/>
+          </a:prstGeom>
+          <a:noFill/>
+          <a:extLst>
+            <a:ext uri="{909E8E84-426E-40DD-AFC4-6F175D3DCCD1}">
+              <a14:hiddenFill xmlns:a14="http://schemas.microsoft.com/office/drawing/2010/main">
+                <a:solidFill>
+                  <a:srgbClr val="FFFFFF"/>
+                </a:solidFill>
+              </a14:hiddenFill>
+            </a:ext>
+          </a:extLst>
+        </p:spPr>
+      </p:pic>
+      <p:sp>
+        <p:nvSpPr>
+          <p:cNvPr id="5" name="Szövegdoboz 4">
+            <a:extLst>
+              <a:ext uri="{FF2B5EF4-FFF2-40B4-BE49-F238E27FC236}">
+                <a16:creationId xmlns:a16="http://schemas.microsoft.com/office/drawing/2014/main" id="{D0681255-96B5-8765-5F3E-1F04DA4FEDC5}"/>
+              </a:ext>
+            </a:extLst>
+          </p:cNvPr>
+          <p:cNvSpPr txBox="1"/>
+          <p:nvPr/>
+        </p:nvSpPr>
+        <p:spPr>
+          <a:xfrm>
+            <a:off x="1652587" y="741225"/>
+            <a:ext cx="7672387" cy="584775"/>
+          </a:xfrm>
+          <a:prstGeom prst="rect">
+            <a:avLst/>
+          </a:prstGeom>
+          <a:noFill/>
+        </p:spPr>
+        <p:txBody>
+          <a:bodyPr wrap="square">
+            <a:spAutoFit/>
+          </a:bodyPr>
+          <a:lstStyle/>
+          <a:p>
+            <a:r>
+              <a:rPr lang="hu-HU" sz="3200" dirty="0">
+                <a:solidFill>
+                  <a:srgbClr val="FFFF00"/>
+                </a:solidFill>
+                <a:latin typeface="Impact" panose="020B0806030902050204" pitchFamily="34" charset="0"/>
+              </a:rPr>
+              <a:t>Asztali alkalmazás célja és ismertetése: </a:t>
+            </a:r>
+          </a:p>
+        </p:txBody>
+      </p:sp>
+      <p:sp>
+        <p:nvSpPr>
+          <p:cNvPr id="4" name="Szövegdoboz 3">
+            <a:extLst>
+              <a:ext uri="{FF2B5EF4-FFF2-40B4-BE49-F238E27FC236}">
+                <a16:creationId xmlns:a16="http://schemas.microsoft.com/office/drawing/2014/main" id="{17A75786-0972-2868-BB64-E96F0B094D40}"/>
+              </a:ext>
+            </a:extLst>
+          </p:cNvPr>
+          <p:cNvSpPr txBox="1"/>
+          <p:nvPr/>
+        </p:nvSpPr>
+        <p:spPr>
+          <a:xfrm>
+            <a:off x="1576388" y="1829842"/>
+            <a:ext cx="10006011" cy="4524315"/>
+          </a:xfrm>
+          <a:prstGeom prst="rect">
+            <a:avLst/>
+          </a:prstGeom>
+          <a:noFill/>
+        </p:spPr>
+        <p:txBody>
+          <a:bodyPr wrap="square" rtlCol="0">
+            <a:spAutoFit/>
+          </a:bodyPr>
+          <a:lstStyle/>
+          <a:p>
+            <a:pPr marL="342900" indent="-342900">
+              <a:buFont typeface="Arial" panose="020B0604020202020204" pitchFamily="34" charset="0"/>
+              <a:buChar char="•"/>
+            </a:pPr>
+            <a:r>
+              <a:rPr lang="hu-HU" sz="2400" dirty="0">
+                <a:solidFill>
+                  <a:srgbClr val="FFFF00"/>
+                </a:solidFill>
+                <a:latin typeface="Impact" panose="020B0806030902050204" pitchFamily="34" charset="0"/>
+              </a:rPr>
+              <a:t>Az asztali alkalmazás a webes alkalmazásunknak a leegyszerűsített verziója</a:t>
+            </a:r>
+          </a:p>
+          <a:p>
+            <a:pPr marL="342900" indent="-342900">
+              <a:buFont typeface="Arial" panose="020B0604020202020204" pitchFamily="34" charset="0"/>
+              <a:buChar char="•"/>
+            </a:pPr>
+            <a:endParaRPr lang="hu-HU" sz="2400" dirty="0">
+              <a:solidFill>
+                <a:srgbClr val="FFFF00"/>
+              </a:solidFill>
+              <a:latin typeface="Impact" panose="020B0806030902050204" pitchFamily="34" charset="0"/>
+            </a:endParaRPr>
+          </a:p>
+          <a:p>
+            <a:pPr marL="342900" indent="-342900">
+              <a:buFont typeface="Arial" panose="020B0604020202020204" pitchFamily="34" charset="0"/>
+              <a:buChar char="•"/>
+            </a:pPr>
+            <a:r>
+              <a:rPr lang="hu-HU" sz="2400" dirty="0">
+                <a:solidFill>
+                  <a:srgbClr val="FFFF00"/>
+                </a:solidFill>
+                <a:latin typeface="Impact" panose="020B0806030902050204" pitchFamily="34" charset="0"/>
+              </a:rPr>
+              <a:t>Felhasználók eltárolására, módosítására, hozzáadására és törlésére van lehetőség</a:t>
+            </a:r>
+          </a:p>
+          <a:p>
+            <a:pPr marL="342900" indent="-342900">
+              <a:buFont typeface="Arial" panose="020B0604020202020204" pitchFamily="34" charset="0"/>
+              <a:buChar char="•"/>
+            </a:pPr>
+            <a:endParaRPr lang="hu-HU" sz="2400" dirty="0">
+              <a:solidFill>
+                <a:srgbClr val="FFFF00"/>
+              </a:solidFill>
+              <a:latin typeface="Impact" panose="020B0806030902050204" pitchFamily="34" charset="0"/>
+            </a:endParaRPr>
+          </a:p>
+          <a:p>
+            <a:pPr marL="342900" indent="-342900">
+              <a:buFont typeface="Arial" panose="020B0604020202020204" pitchFamily="34" charset="0"/>
+              <a:buChar char="•"/>
+            </a:pPr>
+            <a:r>
+              <a:rPr lang="hu-HU" sz="2400" dirty="0">
+                <a:solidFill>
+                  <a:srgbClr val="FFFF00"/>
+                </a:solidFill>
+                <a:latin typeface="Impact" panose="020B0806030902050204" pitchFamily="34" charset="0"/>
+              </a:rPr>
+              <a:t>Asztali felületen megjeleníti a felhasználók adatait</a:t>
+            </a:r>
+          </a:p>
+          <a:p>
+            <a:pPr marL="342900" indent="-342900">
+              <a:buFont typeface="Arial" panose="020B0604020202020204" pitchFamily="34" charset="0"/>
+              <a:buChar char="•"/>
+            </a:pPr>
+            <a:endParaRPr lang="hu-HU" sz="2400" dirty="0">
+              <a:solidFill>
+                <a:srgbClr val="FFFF00"/>
+              </a:solidFill>
+              <a:latin typeface="Impact" panose="020B0806030902050204" pitchFamily="34" charset="0"/>
+            </a:endParaRPr>
+          </a:p>
+          <a:p>
+            <a:pPr marL="342900" indent="-342900">
+              <a:buFont typeface="Arial" panose="020B0604020202020204" pitchFamily="34" charset="0"/>
+              <a:buChar char="•"/>
+            </a:pPr>
+            <a:r>
+              <a:rPr lang="hu-HU" sz="2400" dirty="0">
+                <a:solidFill>
+                  <a:srgbClr val="FFFF00"/>
+                </a:solidFill>
+                <a:latin typeface="Impact" panose="020B0806030902050204" pitchFamily="34" charset="0"/>
+              </a:rPr>
+              <a:t>A felület felhasználóbarát</a:t>
+            </a:r>
+          </a:p>
+          <a:p>
+            <a:pPr marL="342900" indent="-342900">
+              <a:buFont typeface="Arial" panose="020B0604020202020204" pitchFamily="34" charset="0"/>
+              <a:buChar char="•"/>
+            </a:pPr>
+            <a:endParaRPr lang="hu-HU" sz="2400" dirty="0">
+              <a:solidFill>
+                <a:srgbClr val="FFFF00"/>
+              </a:solidFill>
+              <a:latin typeface="Impact" panose="020B0806030902050204" pitchFamily="34" charset="0"/>
+            </a:endParaRPr>
+          </a:p>
+          <a:p>
+            <a:pPr marL="342900" indent="-342900">
+              <a:buFont typeface="Arial" panose="020B0604020202020204" pitchFamily="34" charset="0"/>
+              <a:buChar char="•"/>
+            </a:pPr>
+            <a:r>
+              <a:rPr lang="hu-HU" sz="2400" dirty="0">
+                <a:solidFill>
+                  <a:srgbClr val="FFFF00"/>
+                </a:solidFill>
+                <a:latin typeface="Impact" panose="020B0806030902050204" pitchFamily="34" charset="0"/>
+              </a:rPr>
+              <a:t>Leegyszerűsített kinézet, kevesebb funkció</a:t>
+            </a:r>
+          </a:p>
+          <a:p>
+            <a:pPr marL="342900" indent="-342900">
+              <a:buFont typeface="Arial" panose="020B0604020202020204" pitchFamily="34" charset="0"/>
+              <a:buChar char="•"/>
+            </a:pPr>
+            <a:endParaRPr lang="hu-HU" sz="2400" dirty="0">
+              <a:solidFill>
+                <a:srgbClr val="FFFF00"/>
+              </a:solidFill>
+              <a:latin typeface="Impact" panose="020B0806030902050204" pitchFamily="34" charset="0"/>
+            </a:endParaRPr>
+          </a:p>
+          <a:p>
+            <a:pPr marL="342900" indent="-342900">
+              <a:buFont typeface="Arial" panose="020B0604020202020204" pitchFamily="34" charset="0"/>
+              <a:buChar char="•"/>
+            </a:pPr>
+            <a:endParaRPr lang="hu-HU" sz="2400" dirty="0">
+              <a:solidFill>
+                <a:srgbClr val="FFFF00"/>
+              </a:solidFill>
+              <a:latin typeface="Impact" panose="020B0806030902050204" pitchFamily="34" charset="0"/>
+            </a:endParaRPr>
+          </a:p>
+        </p:txBody>
+      </p:sp>
+    </p:spTree>
+    <p:extLst>
+      <p:ext uri="{BB962C8B-B14F-4D97-AF65-F5344CB8AC3E}">
+        <p14:creationId xmlns:p14="http://schemas.microsoft.com/office/powerpoint/2010/main" val="1573137498"/>
+      </p:ext>
+    </p:extLst>
+  </p:cSld>
+  <p:clrMapOvr>
+    <a:masterClrMapping/>
+  </p:clrMapOvr>
+</p:sld>
+</file>
+
+<file path=ppt/slides/slide18.xml><?xml version="1.0" encoding="utf-8"?>
+<p:sld xmlns:a="http://schemas.openxmlformats.org/drawingml/2006/main" xmlns:r="http://schemas.openxmlformats.org/officeDocument/2006/relationships" xmlns:p="http://schemas.openxmlformats.org/presentationml/2006/main">
+  <p:cSld>
+    <p:spTree>
+      <p:nvGrpSpPr>
+        <p:cNvPr id="1" name=""/>
+        <p:cNvGrpSpPr/>
+        <p:nvPr/>
+      </p:nvGrpSpPr>
+      <p:grpSpPr>
+        <a:xfrm>
+          <a:off x="0" y="0"/>
+          <a:ext cx="0" cy="0"/>
+          <a:chOff x="0" y="0"/>
+          <a:chExt cx="0" cy="0"/>
+        </a:xfrm>
+      </p:grpSpPr>
+      <p:pic>
+        <p:nvPicPr>
+          <p:cNvPr id="1026" name="Picture 2" descr="money Archívum - Ingyenes Angol online nyelvtanulás minden nap">
+            <a:extLst>
+              <a:ext uri="{FF2B5EF4-FFF2-40B4-BE49-F238E27FC236}">
+                <a16:creationId xmlns:a16="http://schemas.microsoft.com/office/drawing/2014/main" id="{845EFDA4-AED0-4EDB-A315-AF405F7561D8}"/>
+              </a:ext>
+            </a:extLst>
+          </p:cNvPr>
+          <p:cNvPicPr>
+            <a:picLocks noChangeAspect="1" noChangeArrowheads="1"/>
+          </p:cNvPicPr>
+          <p:nvPr/>
+        </p:nvPicPr>
+        <p:blipFill>
+          <a:blip r:embed="rId2">
+            <a:extLst>
+              <a:ext uri="{28A0092B-C50C-407E-A947-70E740481C1C}">
+                <a14:useLocalDpi xmlns:a14="http://schemas.microsoft.com/office/drawing/2010/main" val="0"/>
+              </a:ext>
+            </a:extLst>
+          </a:blip>
+          <a:srcRect/>
+          <a:stretch>
+            <a:fillRect/>
+          </a:stretch>
+        </p:blipFill>
+        <p:spPr bwMode="auto">
+          <a:xfrm>
+            <a:off x="0" y="2507"/>
+            <a:ext cx="12192000" cy="6855493"/>
+          </a:xfrm>
+          <a:prstGeom prst="rect">
+            <a:avLst/>
+          </a:prstGeom>
+          <a:noFill/>
+          <a:extLst>
+            <a:ext uri="{909E8E84-426E-40DD-AFC4-6F175D3DCCD1}">
+              <a14:hiddenFill xmlns:a14="http://schemas.microsoft.com/office/drawing/2010/main">
+                <a:solidFill>
+                  <a:srgbClr val="FFFFFF"/>
+                </a:solidFill>
+              </a14:hiddenFill>
+            </a:ext>
+          </a:extLst>
+        </p:spPr>
+      </p:pic>
+      <p:sp>
+        <p:nvSpPr>
+          <p:cNvPr id="6" name="Szövegdoboz 5">
+            <a:extLst>
+              <a:ext uri="{FF2B5EF4-FFF2-40B4-BE49-F238E27FC236}">
+                <a16:creationId xmlns:a16="http://schemas.microsoft.com/office/drawing/2014/main" id="{0067D271-CB6D-0A90-6545-59F8C46C9240}"/>
+              </a:ext>
+            </a:extLst>
+          </p:cNvPr>
+          <p:cNvSpPr txBox="1"/>
+          <p:nvPr/>
+        </p:nvSpPr>
+        <p:spPr>
+          <a:xfrm>
+            <a:off x="993712" y="714126"/>
+            <a:ext cx="7605712" cy="1077218"/>
+          </a:xfrm>
+          <a:prstGeom prst="rect">
+            <a:avLst/>
+          </a:prstGeom>
+          <a:noFill/>
+        </p:spPr>
+        <p:txBody>
+          <a:bodyPr wrap="square">
+            <a:spAutoFit/>
+          </a:bodyPr>
+          <a:lstStyle/>
+          <a:p>
+            <a:r>
+              <a:rPr lang="hu-HU" sz="3200" dirty="0">
+                <a:solidFill>
+                  <a:srgbClr val="FFFF00"/>
+                </a:solidFill>
+                <a:latin typeface="Impact" panose="020B0806030902050204" pitchFamily="34" charset="0"/>
+              </a:rPr>
+              <a:t>Asztali alkalmazás (kapcsolódás az adatbázishoz)</a:t>
+            </a:r>
+          </a:p>
+        </p:txBody>
+      </p:sp>
+      <p:pic>
+        <p:nvPicPr>
+          <p:cNvPr id="7" name="Kép 6">
+            <a:extLst>
+              <a:ext uri="{FF2B5EF4-FFF2-40B4-BE49-F238E27FC236}">
+                <a16:creationId xmlns:a16="http://schemas.microsoft.com/office/drawing/2014/main" id="{A2D8BD67-8B73-0294-C06A-A756AA975296}"/>
+              </a:ext>
+            </a:extLst>
+          </p:cNvPr>
+          <p:cNvPicPr>
+            <a:picLocks noChangeAspect="1"/>
+          </p:cNvPicPr>
+          <p:nvPr/>
+        </p:nvPicPr>
+        <p:blipFill>
+          <a:blip r:embed="rId3">
+            <a:extLst>
+              <a:ext uri="{28A0092B-C50C-407E-A947-70E740481C1C}">
+                <a14:useLocalDpi xmlns:a14="http://schemas.microsoft.com/office/drawing/2010/main" val="0"/>
+              </a:ext>
+            </a:extLst>
+          </a:blip>
+          <a:stretch>
+            <a:fillRect/>
+          </a:stretch>
+        </p:blipFill>
+        <p:spPr>
+          <a:xfrm>
+            <a:off x="4391025" y="1403708"/>
+            <a:ext cx="6740588" cy="5225692"/>
+          </a:xfrm>
+          <a:prstGeom prst="rect">
+            <a:avLst/>
+          </a:prstGeom>
+        </p:spPr>
+      </p:pic>
+    </p:spTree>
+    <p:extLst>
+      <p:ext uri="{BB962C8B-B14F-4D97-AF65-F5344CB8AC3E}">
+        <p14:creationId xmlns:p14="http://schemas.microsoft.com/office/powerpoint/2010/main" val="1529009243"/>
+      </p:ext>
+    </p:extLst>
+  </p:cSld>
+  <p:clrMapOvr>
+    <a:masterClrMapping/>
+  </p:clrMapOvr>
+</p:sld>
+</file>
+
+<file path=ppt/slides/slide19.xml><?xml version="1.0" encoding="utf-8"?>
+<p:sld xmlns:a="http://schemas.openxmlformats.org/drawingml/2006/main" xmlns:r="http://schemas.openxmlformats.org/officeDocument/2006/relationships" xmlns:p="http://schemas.openxmlformats.org/presentationml/2006/main">
+  <p:cSld>
+    <p:spTree>
+      <p:nvGrpSpPr>
+        <p:cNvPr id="1" name=""/>
+        <p:cNvGrpSpPr/>
+        <p:nvPr/>
+      </p:nvGrpSpPr>
+      <p:grpSpPr>
+        <a:xfrm>
+          <a:off x="0" y="0"/>
+          <a:ext cx="0" cy="0"/>
+          <a:chOff x="0" y="0"/>
+          <a:chExt cx="0" cy="0"/>
+        </a:xfrm>
+      </p:grpSpPr>
+      <p:pic>
+        <p:nvPicPr>
+          <p:cNvPr id="1026" name="Picture 2" descr="money Archívum - Ingyenes Angol online nyelvtanulás minden nap">
+            <a:extLst>
+              <a:ext uri="{FF2B5EF4-FFF2-40B4-BE49-F238E27FC236}">
+                <a16:creationId xmlns:a16="http://schemas.microsoft.com/office/drawing/2014/main" id="{845EFDA4-AED0-4EDB-A315-AF405F7561D8}"/>
+              </a:ext>
+            </a:extLst>
+          </p:cNvPr>
+          <p:cNvPicPr>
+            <a:picLocks noChangeAspect="1" noChangeArrowheads="1"/>
+          </p:cNvPicPr>
+          <p:nvPr/>
+        </p:nvPicPr>
+        <p:blipFill>
+          <a:blip r:embed="rId2">
+            <a:extLst>
+              <a:ext uri="{28A0092B-C50C-407E-A947-70E740481C1C}">
+                <a14:useLocalDpi xmlns:a14="http://schemas.microsoft.com/office/drawing/2010/main" val="0"/>
+              </a:ext>
+            </a:extLst>
+          </a:blip>
+          <a:srcRect/>
+          <a:stretch>
+            <a:fillRect/>
+          </a:stretch>
+        </p:blipFill>
+        <p:spPr bwMode="auto">
+          <a:xfrm>
+            <a:off x="0" y="2507"/>
+            <a:ext cx="12192000" cy="6855493"/>
+          </a:xfrm>
+          <a:prstGeom prst="rect">
+            <a:avLst/>
+          </a:prstGeom>
+          <a:noFill/>
+          <a:extLst>
+            <a:ext uri="{909E8E84-426E-40DD-AFC4-6F175D3DCCD1}">
+              <a14:hiddenFill xmlns:a14="http://schemas.microsoft.com/office/drawing/2010/main">
+                <a:solidFill>
+                  <a:srgbClr val="FFFFFF"/>
+                </a:solidFill>
+              </a14:hiddenFill>
+            </a:ext>
+          </a:extLst>
+        </p:spPr>
+      </p:pic>
+      <p:sp>
+        <p:nvSpPr>
+          <p:cNvPr id="9" name="Szövegdoboz 8">
+            <a:extLst>
+              <a:ext uri="{FF2B5EF4-FFF2-40B4-BE49-F238E27FC236}">
+                <a16:creationId xmlns:a16="http://schemas.microsoft.com/office/drawing/2014/main" id="{48F33A4A-54A6-109D-478D-64E6F9EE6620}"/>
+              </a:ext>
+            </a:extLst>
+          </p:cNvPr>
+          <p:cNvSpPr txBox="1"/>
+          <p:nvPr/>
+        </p:nvSpPr>
+        <p:spPr>
+          <a:xfrm>
+            <a:off x="542925" y="754109"/>
+            <a:ext cx="6096000" cy="584775"/>
+          </a:xfrm>
+          <a:prstGeom prst="rect">
+            <a:avLst/>
+          </a:prstGeom>
+          <a:noFill/>
+        </p:spPr>
+        <p:txBody>
+          <a:bodyPr wrap="square">
+            <a:spAutoFit/>
+          </a:bodyPr>
+          <a:lstStyle/>
+          <a:p>
+            <a:r>
+              <a:rPr lang="hu-HU" sz="3200" dirty="0">
+                <a:solidFill>
+                  <a:srgbClr val="FFFF00"/>
+                </a:solidFill>
+                <a:latin typeface="Impact" panose="020B0806030902050204" pitchFamily="34" charset="0"/>
+              </a:rPr>
+              <a:t>Asztali alkalmazás (módosítás)</a:t>
+            </a:r>
+          </a:p>
+        </p:txBody>
+      </p:sp>
+      <p:pic>
+        <p:nvPicPr>
+          <p:cNvPr id="11" name="Kép 10">
+            <a:extLst>
+              <a:ext uri="{FF2B5EF4-FFF2-40B4-BE49-F238E27FC236}">
+                <a16:creationId xmlns:a16="http://schemas.microsoft.com/office/drawing/2014/main" id="{08F626AE-51B3-B696-C65D-6673A3084FB0}"/>
+              </a:ext>
+            </a:extLst>
+          </p:cNvPr>
+          <p:cNvPicPr>
+            <a:picLocks noChangeAspect="1"/>
+          </p:cNvPicPr>
+          <p:nvPr/>
+        </p:nvPicPr>
+        <p:blipFill>
+          <a:blip r:embed="rId3">
+            <a:extLst>
+              <a:ext uri="{28A0092B-C50C-407E-A947-70E740481C1C}">
+                <a14:useLocalDpi xmlns:a14="http://schemas.microsoft.com/office/drawing/2010/main" val="0"/>
+              </a:ext>
+            </a:extLst>
+          </a:blip>
+          <a:stretch>
+            <a:fillRect/>
+          </a:stretch>
+        </p:blipFill>
+        <p:spPr>
+          <a:xfrm>
+            <a:off x="103447" y="1917734"/>
+            <a:ext cx="5992553" cy="4739908"/>
+          </a:xfrm>
+          <a:prstGeom prst="rect">
+            <a:avLst/>
+          </a:prstGeom>
+        </p:spPr>
+      </p:pic>
+      <p:pic>
+        <p:nvPicPr>
+          <p:cNvPr id="13" name="Kép 12">
+            <a:extLst>
+              <a:ext uri="{FF2B5EF4-FFF2-40B4-BE49-F238E27FC236}">
+                <a16:creationId xmlns:a16="http://schemas.microsoft.com/office/drawing/2014/main" id="{3E97306F-BDCB-7D1E-C901-3D32A66F3B8A}"/>
+              </a:ext>
+            </a:extLst>
+          </p:cNvPr>
+          <p:cNvPicPr>
+            <a:picLocks noChangeAspect="1"/>
+          </p:cNvPicPr>
+          <p:nvPr/>
+        </p:nvPicPr>
+        <p:blipFill>
+          <a:blip r:embed="rId4"/>
+          <a:stretch>
+            <a:fillRect/>
+          </a:stretch>
+        </p:blipFill>
+        <p:spPr>
+          <a:xfrm>
+            <a:off x="6129474" y="1917734"/>
+            <a:ext cx="6062526" cy="4739908"/>
+          </a:xfrm>
+          <a:prstGeom prst="rect">
+            <a:avLst/>
+          </a:prstGeom>
+        </p:spPr>
+      </p:pic>
+    </p:spTree>
+    <p:extLst>
+      <p:ext uri="{BB962C8B-B14F-4D97-AF65-F5344CB8AC3E}">
+        <p14:creationId xmlns:p14="http://schemas.microsoft.com/office/powerpoint/2010/main" val="3490480153"/>
       </p:ext>
     </p:extLst>
   </p:cSld>
@@ -4020,7 +6475,7 @@
         </p:blipFill>
         <p:spPr bwMode="auto">
           <a:xfrm>
-            <a:off x="0" y="-102268"/>
+            <a:off x="0" y="2507"/>
             <a:ext cx="12192000" cy="6855493"/>
           </a:xfrm>
           <a:prstGeom prst="rect">
@@ -4052,8 +6507,8 @@
         </p:nvSpPr>
         <p:spPr>
           <a:xfrm>
-            <a:off x="990600" y="951276"/>
-            <a:ext cx="4781550" cy="646331"/>
+            <a:off x="1552575" y="1083495"/>
+            <a:ext cx="8772525" cy="584775"/>
           </a:xfrm>
           <a:prstGeom prst="rect">
             <a:avLst/>
@@ -4067,18 +6522,18 @@
           <a:lstStyle/>
           <a:p>
             <a:r>
-              <a:rPr lang="hu-HU" sz="3600" dirty="0">
-                <a:solidFill>
-                  <a:srgbClr val="00B050"/>
+              <a:rPr lang="hu-HU" sz="3200" dirty="0">
+                <a:solidFill>
+                  <a:srgbClr val="FFFF00"/>
                 </a:solidFill>
                 <a:latin typeface="Impact" panose="020B0806030902050204" pitchFamily="34" charset="0"/>
               </a:rPr>
-              <a:t>Témaválasztás oka</a:t>
-            </a:r>
-            <a:r>
-              <a:rPr lang="hu-HU" sz="3600" dirty="0">
-                <a:solidFill>
-                  <a:srgbClr val="00B050"/>
+              <a:t>Témaválasztás okai és információk a programról</a:t>
+            </a:r>
+            <a:r>
+              <a:rPr lang="hu-HU" sz="3200" dirty="0">
+                <a:solidFill>
+                  <a:srgbClr val="FFFF00"/>
                 </a:solidFill>
               </a:rPr>
               <a:t>:</a:t>
@@ -4100,8 +6555,8 @@
         </p:nvSpPr>
         <p:spPr>
           <a:xfrm>
-            <a:off x="1762125" y="2651151"/>
-            <a:ext cx="8667750" cy="3046988"/>
+            <a:off x="1552575" y="2059318"/>
+            <a:ext cx="9696450" cy="4524315"/>
           </a:xfrm>
           <a:prstGeom prst="rect">
             <a:avLst/>
@@ -4121,17 +6576,17 @@
             <a:r>
               <a:rPr lang="hu-HU" sz="2400" dirty="0">
                 <a:solidFill>
-                  <a:srgbClr val="00B050"/>
+                  <a:srgbClr val="FFFF00"/>
                 </a:solidFill>
                 <a:latin typeface="Impact" panose="020B0806030902050204" pitchFamily="34" charset="0"/>
               </a:rPr>
-              <a:t>Praktikus az alkalmazás a mindennapi pénzügyi problémák kezelésére</a:t>
+              <a:t>Praktikus alkalmazás a mindennapi pénzügyi problémák kezelésére</a:t>
             </a:r>
           </a:p>
           <a:p>
             <a:endParaRPr lang="hu-HU" sz="2400" dirty="0">
               <a:solidFill>
-                <a:srgbClr val="00B050"/>
+                <a:srgbClr val="FFFF00"/>
               </a:solidFill>
               <a:latin typeface="Impact" panose="020B0806030902050204" pitchFamily="34" charset="0"/>
             </a:endParaRPr>
@@ -4144,7 +6599,7 @@
             <a:r>
               <a:rPr lang="hu-HU" sz="2400" dirty="0">
                 <a:solidFill>
-                  <a:srgbClr val="00B050"/>
+                  <a:srgbClr val="FFFF00"/>
                 </a:solidFill>
                 <a:latin typeface="Impact" panose="020B0806030902050204" pitchFamily="34" charset="0"/>
               </a:rPr>
@@ -4154,7 +6609,7 @@
           <a:p>
             <a:endParaRPr lang="hu-HU" sz="2400" dirty="0">
               <a:solidFill>
-                <a:srgbClr val="00B050"/>
+                <a:srgbClr val="FFFF00"/>
               </a:solidFill>
               <a:latin typeface="Impact" panose="020B0806030902050204" pitchFamily="34" charset="0"/>
             </a:endParaRPr>
@@ -4167,7 +6622,7 @@
             <a:r>
               <a:rPr lang="hu-HU" sz="2400" dirty="0">
                 <a:solidFill>
-                  <a:srgbClr val="00B050"/>
+                  <a:srgbClr val="FFFF00"/>
                 </a:solidFill>
                 <a:latin typeface="Impact" panose="020B0806030902050204" pitchFamily="34" charset="0"/>
               </a:rPr>
@@ -4175,9 +6630,63 @@
             </a:r>
           </a:p>
           <a:p>
+            <a:pPr marL="285750" indent="-285750">
+              <a:buFont typeface="Arial" panose="020B0604020202020204" pitchFamily="34" charset="0"/>
+              <a:buChar char="•"/>
+            </a:pPr>
             <a:endParaRPr lang="hu-HU" sz="2400" dirty="0">
               <a:solidFill>
-                <a:srgbClr val="00B050"/>
+                <a:srgbClr val="FFFF00"/>
+              </a:solidFill>
+              <a:latin typeface="Impact" panose="020B0806030902050204" pitchFamily="34" charset="0"/>
+            </a:endParaRPr>
+          </a:p>
+          <a:p>
+            <a:pPr marL="285750" indent="-285750">
+              <a:buFont typeface="Arial" panose="020B0604020202020204" pitchFamily="34" charset="0"/>
+              <a:buChar char="•"/>
+            </a:pPr>
+            <a:r>
+              <a:rPr lang="hu-HU" sz="2400" dirty="0">
+                <a:solidFill>
+                  <a:srgbClr val="FFFF00"/>
+                </a:solidFill>
+                <a:latin typeface="Impact" panose="020B0806030902050204" pitchFamily="34" charset="0"/>
+              </a:rPr>
+              <a:t>Az alkalmazásunk nemzetközi felhasználásra készült, ezért angol nyelven íródott </a:t>
+            </a:r>
+          </a:p>
+          <a:p>
+            <a:pPr marL="285750" indent="-285750">
+              <a:buFont typeface="Arial" panose="020B0604020202020204" pitchFamily="34" charset="0"/>
+              <a:buChar char="•"/>
+            </a:pPr>
+            <a:endParaRPr lang="hu-HU" sz="2400" dirty="0">
+              <a:solidFill>
+                <a:srgbClr val="FFFF00"/>
+              </a:solidFill>
+              <a:latin typeface="Impact" panose="020B0806030902050204" pitchFamily="34" charset="0"/>
+            </a:endParaRPr>
+          </a:p>
+          <a:p>
+            <a:pPr marL="285750" indent="-285750">
+              <a:buFont typeface="Arial" panose="020B0604020202020204" pitchFamily="34" charset="0"/>
+              <a:buChar char="•"/>
+            </a:pPr>
+            <a:r>
+              <a:rPr lang="hu-HU" sz="2400" dirty="0">
+                <a:solidFill>
+                  <a:srgbClr val="FFFF00"/>
+                </a:solidFill>
+                <a:latin typeface="Impact" panose="020B0806030902050204" pitchFamily="34" charset="0"/>
+              </a:rPr>
+              <a:t>A programunk nyílt forráskódú és MVC-programtervezési mintát használ</a:t>
+            </a:r>
+          </a:p>
+          <a:p>
+            <a:endParaRPr lang="hu-HU" sz="2400" dirty="0">
+              <a:solidFill>
+                <a:srgbClr val="FFFF00"/>
               </a:solidFill>
             </a:endParaRPr>
           </a:p>
@@ -4194,6 +6703,807 @@
     <p:extLst>
       <p:ext uri="{BB962C8B-B14F-4D97-AF65-F5344CB8AC3E}">
         <p14:creationId xmlns:p14="http://schemas.microsoft.com/office/powerpoint/2010/main" val="1855901777"/>
+      </p:ext>
+    </p:extLst>
+  </p:cSld>
+  <p:clrMapOvr>
+    <a:masterClrMapping/>
+  </p:clrMapOvr>
+</p:sld>
+</file>
+
+<file path=ppt/slides/slide20.xml><?xml version="1.0" encoding="utf-8"?>
+<p:sld xmlns:a="http://schemas.openxmlformats.org/drawingml/2006/main" xmlns:r="http://schemas.openxmlformats.org/officeDocument/2006/relationships" xmlns:p="http://schemas.openxmlformats.org/presentationml/2006/main">
+  <p:cSld>
+    <p:spTree>
+      <p:nvGrpSpPr>
+        <p:cNvPr id="1" name=""/>
+        <p:cNvGrpSpPr/>
+        <p:nvPr/>
+      </p:nvGrpSpPr>
+      <p:grpSpPr>
+        <a:xfrm>
+          <a:off x="0" y="0"/>
+          <a:ext cx="0" cy="0"/>
+          <a:chOff x="0" y="0"/>
+          <a:chExt cx="0" cy="0"/>
+        </a:xfrm>
+      </p:grpSpPr>
+      <p:pic>
+        <p:nvPicPr>
+          <p:cNvPr id="1026" name="Picture 2" descr="money Archívum - Ingyenes Angol online nyelvtanulás minden nap">
+            <a:extLst>
+              <a:ext uri="{FF2B5EF4-FFF2-40B4-BE49-F238E27FC236}">
+                <a16:creationId xmlns:a16="http://schemas.microsoft.com/office/drawing/2014/main" id="{845EFDA4-AED0-4EDB-A315-AF405F7561D8}"/>
+              </a:ext>
+            </a:extLst>
+          </p:cNvPr>
+          <p:cNvPicPr>
+            <a:picLocks noChangeAspect="1" noChangeArrowheads="1"/>
+          </p:cNvPicPr>
+          <p:nvPr/>
+        </p:nvPicPr>
+        <p:blipFill>
+          <a:blip r:embed="rId2">
+            <a:extLst>
+              <a:ext uri="{28A0092B-C50C-407E-A947-70E740481C1C}">
+                <a14:useLocalDpi xmlns:a14="http://schemas.microsoft.com/office/drawing/2010/main" val="0"/>
+              </a:ext>
+            </a:extLst>
+          </a:blip>
+          <a:srcRect/>
+          <a:stretch>
+            <a:fillRect/>
+          </a:stretch>
+        </p:blipFill>
+        <p:spPr bwMode="auto">
+          <a:xfrm>
+            <a:off x="1" y="2507"/>
+            <a:ext cx="12192000" cy="6855493"/>
+          </a:xfrm>
+          <a:prstGeom prst="rect">
+            <a:avLst/>
+          </a:prstGeom>
+          <a:noFill/>
+          <a:extLst>
+            <a:ext uri="{909E8E84-426E-40DD-AFC4-6F175D3DCCD1}">
+              <a14:hiddenFill xmlns:a14="http://schemas.microsoft.com/office/drawing/2010/main">
+                <a:solidFill>
+                  <a:srgbClr val="FFFFFF"/>
+                </a:solidFill>
+              </a14:hiddenFill>
+            </a:ext>
+          </a:extLst>
+        </p:spPr>
+      </p:pic>
+      <p:sp>
+        <p:nvSpPr>
+          <p:cNvPr id="6" name="Szövegdoboz 5">
+            <a:extLst>
+              <a:ext uri="{FF2B5EF4-FFF2-40B4-BE49-F238E27FC236}">
+                <a16:creationId xmlns:a16="http://schemas.microsoft.com/office/drawing/2014/main" id="{B0D39641-644B-F045-59CD-E88870F9D021}"/>
+              </a:ext>
+            </a:extLst>
+          </p:cNvPr>
+          <p:cNvSpPr txBox="1"/>
+          <p:nvPr/>
+        </p:nvSpPr>
+        <p:spPr>
+          <a:xfrm>
+            <a:off x="1014413" y="586859"/>
+            <a:ext cx="6162674" cy="584775"/>
+          </a:xfrm>
+          <a:prstGeom prst="rect">
+            <a:avLst/>
+          </a:prstGeom>
+          <a:noFill/>
+        </p:spPr>
+        <p:txBody>
+          <a:bodyPr wrap="square">
+            <a:spAutoFit/>
+          </a:bodyPr>
+          <a:lstStyle/>
+          <a:p>
+            <a:r>
+              <a:rPr lang="hu-HU" sz="3200" dirty="0">
+                <a:solidFill>
+                  <a:srgbClr val="FFFF00"/>
+                </a:solidFill>
+                <a:latin typeface="Impact" panose="020B0806030902050204" pitchFamily="34" charset="0"/>
+              </a:rPr>
+              <a:t>Asztali alkalmazás (törlés)</a:t>
+            </a:r>
+          </a:p>
+        </p:txBody>
+      </p:sp>
+      <p:pic>
+        <p:nvPicPr>
+          <p:cNvPr id="9" name="Kép 8">
+            <a:extLst>
+              <a:ext uri="{FF2B5EF4-FFF2-40B4-BE49-F238E27FC236}">
+                <a16:creationId xmlns:a16="http://schemas.microsoft.com/office/drawing/2014/main" id="{87879B1F-9B0C-9F15-FD67-D261950CA090}"/>
+              </a:ext>
+            </a:extLst>
+          </p:cNvPr>
+          <p:cNvPicPr>
+            <a:picLocks noChangeAspect="1"/>
+          </p:cNvPicPr>
+          <p:nvPr/>
+        </p:nvPicPr>
+        <p:blipFill>
+          <a:blip r:embed="rId3">
+            <a:extLst>
+              <a:ext uri="{28A0092B-C50C-407E-A947-70E740481C1C}">
+                <a14:useLocalDpi xmlns:a14="http://schemas.microsoft.com/office/drawing/2010/main" val="0"/>
+              </a:ext>
+            </a:extLst>
+          </a:blip>
+          <a:stretch>
+            <a:fillRect/>
+          </a:stretch>
+        </p:blipFill>
+        <p:spPr>
+          <a:xfrm>
+            <a:off x="4672013" y="1293512"/>
+            <a:ext cx="6976961" cy="5442609"/>
+          </a:xfrm>
+          <a:prstGeom prst="rect">
+            <a:avLst/>
+          </a:prstGeom>
+        </p:spPr>
+      </p:pic>
+    </p:spTree>
+    <p:extLst>
+      <p:ext uri="{BB962C8B-B14F-4D97-AF65-F5344CB8AC3E}">
+        <p14:creationId xmlns:p14="http://schemas.microsoft.com/office/powerpoint/2010/main" val="312192995"/>
+      </p:ext>
+    </p:extLst>
+  </p:cSld>
+  <p:clrMapOvr>
+    <a:masterClrMapping/>
+  </p:clrMapOvr>
+</p:sld>
+</file>
+
+<file path=ppt/slides/slide21.xml><?xml version="1.0" encoding="utf-8"?>
+<p:sld xmlns:a="http://schemas.openxmlformats.org/drawingml/2006/main" xmlns:r="http://schemas.openxmlformats.org/officeDocument/2006/relationships" xmlns:p="http://schemas.openxmlformats.org/presentationml/2006/main">
+  <p:cSld>
+    <p:spTree>
+      <p:nvGrpSpPr>
+        <p:cNvPr id="1" name=""/>
+        <p:cNvGrpSpPr/>
+        <p:nvPr/>
+      </p:nvGrpSpPr>
+      <p:grpSpPr>
+        <a:xfrm>
+          <a:off x="0" y="0"/>
+          <a:ext cx="0" cy="0"/>
+          <a:chOff x="0" y="0"/>
+          <a:chExt cx="0" cy="0"/>
+        </a:xfrm>
+      </p:grpSpPr>
+      <p:pic>
+        <p:nvPicPr>
+          <p:cNvPr id="4" name="Picture 2" descr="money Archívum - Ingyenes Angol online nyelvtanulás minden nap">
+            <a:extLst>
+              <a:ext uri="{FF2B5EF4-FFF2-40B4-BE49-F238E27FC236}">
+                <a16:creationId xmlns:a16="http://schemas.microsoft.com/office/drawing/2014/main" id="{A4C435B3-56EC-28F4-B612-D75F9DE2DFCF}"/>
+              </a:ext>
+            </a:extLst>
+          </p:cNvPr>
+          <p:cNvPicPr>
+            <a:picLocks noChangeAspect="1" noChangeArrowheads="1"/>
+          </p:cNvPicPr>
+          <p:nvPr/>
+        </p:nvPicPr>
+        <p:blipFill>
+          <a:blip r:embed="rId2">
+            <a:extLst>
+              <a:ext uri="{28A0092B-C50C-407E-A947-70E740481C1C}">
+                <a14:useLocalDpi xmlns:a14="http://schemas.microsoft.com/office/drawing/2010/main" val="0"/>
+              </a:ext>
+            </a:extLst>
+          </a:blip>
+          <a:srcRect/>
+          <a:stretch>
+            <a:fillRect/>
+          </a:stretch>
+        </p:blipFill>
+        <p:spPr bwMode="auto">
+          <a:xfrm>
+            <a:off x="0" y="2507"/>
+            <a:ext cx="12192000" cy="6855493"/>
+          </a:xfrm>
+          <a:prstGeom prst="rect">
+            <a:avLst/>
+          </a:prstGeom>
+          <a:noFill/>
+          <a:extLst>
+            <a:ext uri="{909E8E84-426E-40DD-AFC4-6F175D3DCCD1}">
+              <a14:hiddenFill xmlns:a14="http://schemas.microsoft.com/office/drawing/2010/main">
+                <a:solidFill>
+                  <a:srgbClr val="FFFFFF"/>
+                </a:solidFill>
+              </a14:hiddenFill>
+            </a:ext>
+          </a:extLst>
+        </p:spPr>
+      </p:pic>
+      <p:sp>
+        <p:nvSpPr>
+          <p:cNvPr id="6" name="Szövegdoboz 5">
+            <a:extLst>
+              <a:ext uri="{FF2B5EF4-FFF2-40B4-BE49-F238E27FC236}">
+                <a16:creationId xmlns:a16="http://schemas.microsoft.com/office/drawing/2014/main" id="{8A865CA0-8027-2982-F452-C2A59E420830}"/>
+              </a:ext>
+            </a:extLst>
+          </p:cNvPr>
+          <p:cNvSpPr txBox="1"/>
+          <p:nvPr/>
+        </p:nvSpPr>
+        <p:spPr>
+          <a:xfrm>
+            <a:off x="842963" y="354177"/>
+            <a:ext cx="8367712" cy="584775"/>
+          </a:xfrm>
+          <a:prstGeom prst="rect">
+            <a:avLst/>
+          </a:prstGeom>
+          <a:noFill/>
+        </p:spPr>
+        <p:txBody>
+          <a:bodyPr wrap="square">
+            <a:spAutoFit/>
+          </a:bodyPr>
+          <a:lstStyle/>
+          <a:p>
+            <a:r>
+              <a:rPr lang="hu-HU" sz="3200" dirty="0">
+                <a:solidFill>
+                  <a:srgbClr val="FFFF00"/>
+                </a:solidFill>
+                <a:latin typeface="Impact" panose="020B0806030902050204" pitchFamily="34" charset="0"/>
+              </a:rPr>
+              <a:t>Asztali alkalmazás (adatbázisba mentés/kiírás)</a:t>
+            </a:r>
+          </a:p>
+        </p:txBody>
+      </p:sp>
+      <p:pic>
+        <p:nvPicPr>
+          <p:cNvPr id="12" name="Kép 11">
+            <a:extLst>
+              <a:ext uri="{FF2B5EF4-FFF2-40B4-BE49-F238E27FC236}">
+                <a16:creationId xmlns:a16="http://schemas.microsoft.com/office/drawing/2014/main" id="{2E9DEEE0-1196-7435-B92D-C0D77BA0FCA6}"/>
+              </a:ext>
+            </a:extLst>
+          </p:cNvPr>
+          <p:cNvPicPr>
+            <a:picLocks noChangeAspect="1"/>
+          </p:cNvPicPr>
+          <p:nvPr/>
+        </p:nvPicPr>
+        <p:blipFill>
+          <a:blip r:embed="rId3">
+            <a:extLst>
+              <a:ext uri="{28A0092B-C50C-407E-A947-70E740481C1C}">
+                <a14:useLocalDpi xmlns:a14="http://schemas.microsoft.com/office/drawing/2010/main" val="0"/>
+              </a:ext>
+            </a:extLst>
+          </a:blip>
+          <a:stretch>
+            <a:fillRect/>
+          </a:stretch>
+        </p:blipFill>
+        <p:spPr>
+          <a:xfrm>
+            <a:off x="4424363" y="1002025"/>
+            <a:ext cx="7078980" cy="5501798"/>
+          </a:xfrm>
+          <a:prstGeom prst="rect">
+            <a:avLst/>
+          </a:prstGeom>
+        </p:spPr>
+      </p:pic>
+    </p:spTree>
+    <p:extLst>
+      <p:ext uri="{BB962C8B-B14F-4D97-AF65-F5344CB8AC3E}">
+        <p14:creationId xmlns:p14="http://schemas.microsoft.com/office/powerpoint/2010/main" val="1790079095"/>
+      </p:ext>
+    </p:extLst>
+  </p:cSld>
+  <p:clrMapOvr>
+    <a:masterClrMapping/>
+  </p:clrMapOvr>
+</p:sld>
+</file>
+
+<file path=ppt/slides/slide22.xml><?xml version="1.0" encoding="utf-8"?>
+<p:sld xmlns:a="http://schemas.openxmlformats.org/drawingml/2006/main" xmlns:r="http://schemas.openxmlformats.org/officeDocument/2006/relationships" xmlns:p="http://schemas.openxmlformats.org/presentationml/2006/main">
+  <p:cSld>
+    <p:spTree>
+      <p:nvGrpSpPr>
+        <p:cNvPr id="1" name=""/>
+        <p:cNvGrpSpPr/>
+        <p:nvPr/>
+      </p:nvGrpSpPr>
+      <p:grpSpPr>
+        <a:xfrm>
+          <a:off x="0" y="0"/>
+          <a:ext cx="0" cy="0"/>
+          <a:chOff x="0" y="0"/>
+          <a:chExt cx="0" cy="0"/>
+        </a:xfrm>
+      </p:grpSpPr>
+      <p:pic>
+        <p:nvPicPr>
+          <p:cNvPr id="4" name="Picture 2" descr="money Archívum - Ingyenes Angol online nyelvtanulás minden nap">
+            <a:extLst>
+              <a:ext uri="{FF2B5EF4-FFF2-40B4-BE49-F238E27FC236}">
+                <a16:creationId xmlns:a16="http://schemas.microsoft.com/office/drawing/2014/main" id="{A4C435B3-56EC-28F4-B612-D75F9DE2DFCF}"/>
+              </a:ext>
+            </a:extLst>
+          </p:cNvPr>
+          <p:cNvPicPr>
+            <a:picLocks noChangeAspect="1" noChangeArrowheads="1"/>
+          </p:cNvPicPr>
+          <p:nvPr/>
+        </p:nvPicPr>
+        <p:blipFill>
+          <a:blip r:embed="rId2">
+            <a:extLst>
+              <a:ext uri="{28A0092B-C50C-407E-A947-70E740481C1C}">
+                <a14:useLocalDpi xmlns:a14="http://schemas.microsoft.com/office/drawing/2010/main" val="0"/>
+              </a:ext>
+            </a:extLst>
+          </a:blip>
+          <a:srcRect/>
+          <a:stretch>
+            <a:fillRect/>
+          </a:stretch>
+        </p:blipFill>
+        <p:spPr bwMode="auto">
+          <a:xfrm>
+            <a:off x="0" y="2507"/>
+            <a:ext cx="12192000" cy="6855493"/>
+          </a:xfrm>
+          <a:prstGeom prst="rect">
+            <a:avLst/>
+          </a:prstGeom>
+          <a:noFill/>
+          <a:extLst>
+            <a:ext uri="{909E8E84-426E-40DD-AFC4-6F175D3DCCD1}">
+              <a14:hiddenFill xmlns:a14="http://schemas.microsoft.com/office/drawing/2010/main">
+                <a:solidFill>
+                  <a:srgbClr val="FFFFFF"/>
+                </a:solidFill>
+              </a14:hiddenFill>
+            </a:ext>
+          </a:extLst>
+        </p:spPr>
+      </p:pic>
+      <p:sp>
+        <p:nvSpPr>
+          <p:cNvPr id="6" name="Szövegdoboz 5">
+            <a:extLst>
+              <a:ext uri="{FF2B5EF4-FFF2-40B4-BE49-F238E27FC236}">
+                <a16:creationId xmlns:a16="http://schemas.microsoft.com/office/drawing/2014/main" id="{8A865CA0-8027-2982-F452-C2A59E420830}"/>
+              </a:ext>
+            </a:extLst>
+          </p:cNvPr>
+          <p:cNvSpPr txBox="1"/>
+          <p:nvPr/>
+        </p:nvSpPr>
+        <p:spPr>
+          <a:xfrm>
+            <a:off x="409577" y="-220861"/>
+            <a:ext cx="7705725" cy="1077218"/>
+          </a:xfrm>
+          <a:prstGeom prst="rect">
+            <a:avLst/>
+          </a:prstGeom>
+          <a:noFill/>
+        </p:spPr>
+        <p:txBody>
+          <a:bodyPr wrap="square">
+            <a:spAutoFit/>
+          </a:bodyPr>
+          <a:lstStyle/>
+          <a:p>
+            <a:endParaRPr lang="hu-HU" sz="3200" dirty="0">
+              <a:solidFill>
+                <a:srgbClr val="FFFF00"/>
+              </a:solidFill>
+              <a:latin typeface="Impact" panose="020B0806030902050204" pitchFamily="34" charset="0"/>
+            </a:endParaRPr>
+          </a:p>
+          <a:p>
+            <a:r>
+              <a:rPr lang="hu-HU" sz="3200" dirty="0">
+                <a:solidFill>
+                  <a:srgbClr val="FFFF00"/>
+                </a:solidFill>
+                <a:latin typeface="Impact" panose="020B0806030902050204" pitchFamily="34" charset="0"/>
+              </a:rPr>
+              <a:t>Továbbfejlesztési lehetőségek</a:t>
+            </a:r>
+          </a:p>
+        </p:txBody>
+      </p:sp>
+      <p:sp>
+        <p:nvSpPr>
+          <p:cNvPr id="7" name="Szövegdoboz 6">
+            <a:extLst>
+              <a:ext uri="{FF2B5EF4-FFF2-40B4-BE49-F238E27FC236}">
+                <a16:creationId xmlns:a16="http://schemas.microsoft.com/office/drawing/2014/main" id="{F60BFEF8-C4A9-3A11-0DBD-F3E8225A391F}"/>
+              </a:ext>
+            </a:extLst>
+          </p:cNvPr>
+          <p:cNvSpPr txBox="1"/>
+          <p:nvPr/>
+        </p:nvSpPr>
+        <p:spPr>
+          <a:xfrm>
+            <a:off x="447674" y="856357"/>
+            <a:ext cx="11334749" cy="6001643"/>
+          </a:xfrm>
+          <a:prstGeom prst="rect">
+            <a:avLst/>
+          </a:prstGeom>
+          <a:noFill/>
+        </p:spPr>
+        <p:txBody>
+          <a:bodyPr wrap="square">
+            <a:spAutoFit/>
+          </a:bodyPr>
+          <a:lstStyle/>
+          <a:p>
+            <a:pPr marL="457200" indent="-457200">
+              <a:buFont typeface="+mj-lt"/>
+              <a:buAutoNum type="arabicPeriod"/>
+            </a:pPr>
+            <a:r>
+              <a:rPr lang="hu-HU" sz="2400" dirty="0">
+                <a:solidFill>
+                  <a:srgbClr val="FFFF00"/>
+                </a:solidFill>
+                <a:latin typeface="Impact" panose="020B0806030902050204" pitchFamily="34" charset="0"/>
+              </a:rPr>
+              <a:t>Keresési gomb működőképessé tétele, amivel rákereshetünk egy bizonyos adatra</a:t>
+            </a:r>
+          </a:p>
+          <a:p>
+            <a:pPr marL="457200" indent="-457200">
+              <a:buFont typeface="+mj-lt"/>
+              <a:buAutoNum type="arabicPeriod"/>
+            </a:pPr>
+            <a:endParaRPr lang="hu-HU" sz="2400" dirty="0">
+              <a:solidFill>
+                <a:srgbClr val="FFFF00"/>
+              </a:solidFill>
+              <a:latin typeface="Impact" panose="020B0806030902050204" pitchFamily="34" charset="0"/>
+            </a:endParaRPr>
+          </a:p>
+          <a:p>
+            <a:pPr marL="457200" indent="-457200">
+              <a:buFont typeface="+mj-lt"/>
+              <a:buAutoNum type="arabicPeriod"/>
+            </a:pPr>
+            <a:r>
+              <a:rPr lang="hu-HU" sz="2400" dirty="0">
+                <a:solidFill>
+                  <a:srgbClr val="FFFF00"/>
+                </a:solidFill>
+                <a:latin typeface="Impact" panose="020B0806030902050204" pitchFamily="34" charset="0"/>
+              </a:rPr>
+              <a:t>Külön hibaüzenet megjelenítése a bejelentkező felületen a jelszó mezőben</a:t>
+            </a:r>
+          </a:p>
+          <a:p>
+            <a:pPr marL="457200" indent="-457200">
+              <a:buFont typeface="+mj-lt"/>
+              <a:buAutoNum type="arabicPeriod"/>
+            </a:pPr>
+            <a:endParaRPr lang="hu-HU" sz="2400" dirty="0">
+              <a:solidFill>
+                <a:srgbClr val="FFFF00"/>
+              </a:solidFill>
+              <a:latin typeface="Impact" panose="020B0806030902050204" pitchFamily="34" charset="0"/>
+            </a:endParaRPr>
+          </a:p>
+          <a:p>
+            <a:pPr marL="457200" indent="-457200">
+              <a:buFont typeface="+mj-lt"/>
+              <a:buAutoNum type="arabicPeriod"/>
+            </a:pPr>
+            <a:r>
+              <a:rPr lang="hu-HU" sz="2400" dirty="0">
+                <a:solidFill>
+                  <a:srgbClr val="FFFF00"/>
+                </a:solidFill>
+                <a:latin typeface="Impact" panose="020B0806030902050204" pitchFamily="34" charset="0"/>
+              </a:rPr>
+              <a:t>Elfelejtette jelszavát gomb fejlesztése úgy, hogy valóban küldjön egy linket az adott e-mail címre, amire rákattintva megváltoztathatja a jelszavát a felhasználó</a:t>
+            </a:r>
+          </a:p>
+          <a:p>
+            <a:pPr marL="457200" indent="-457200">
+              <a:buFont typeface="+mj-lt"/>
+              <a:buAutoNum type="arabicPeriod"/>
+            </a:pPr>
+            <a:endParaRPr lang="hu-HU" sz="2400" dirty="0">
+              <a:solidFill>
+                <a:srgbClr val="FFFF00"/>
+              </a:solidFill>
+              <a:latin typeface="Impact" panose="020B0806030902050204" pitchFamily="34" charset="0"/>
+            </a:endParaRPr>
+          </a:p>
+          <a:p>
+            <a:pPr marL="457200" indent="-457200">
+              <a:buFont typeface="+mj-lt"/>
+              <a:buAutoNum type="arabicPeriod"/>
+            </a:pPr>
+            <a:r>
+              <a:rPr lang="hu-HU" sz="2400" dirty="0">
+                <a:solidFill>
+                  <a:srgbClr val="FFFF00"/>
+                </a:solidFill>
+                <a:latin typeface="Impact" panose="020B0806030902050204" pitchFamily="34" charset="0"/>
+              </a:rPr>
+              <a:t>A teljes webes alkalmazás átalakítása asztali alkalmazássá (most csak egy része van lekódolva)</a:t>
+            </a:r>
+          </a:p>
+          <a:p>
+            <a:pPr marL="457200" indent="-457200">
+              <a:buFont typeface="+mj-lt"/>
+              <a:buAutoNum type="arabicPeriod"/>
+            </a:pPr>
+            <a:endParaRPr lang="hu-HU" sz="2400" dirty="0">
+              <a:solidFill>
+                <a:srgbClr val="FFFF00"/>
+              </a:solidFill>
+              <a:latin typeface="Impact" panose="020B0806030902050204" pitchFamily="34" charset="0"/>
+            </a:endParaRPr>
+          </a:p>
+          <a:p>
+            <a:pPr marL="457200" indent="-457200">
+              <a:buFont typeface="+mj-lt"/>
+              <a:buAutoNum type="arabicPeriod"/>
+            </a:pPr>
+            <a:r>
+              <a:rPr lang="hu-HU" sz="2400" dirty="0">
+                <a:solidFill>
+                  <a:srgbClr val="FFFF00"/>
+                </a:solidFill>
+                <a:latin typeface="Impact" panose="020B0806030902050204" pitchFamily="34" charset="0"/>
+              </a:rPr>
+              <a:t>A telefonos használat lehetővé tétele</a:t>
+            </a:r>
+          </a:p>
+          <a:p>
+            <a:pPr marL="457200" indent="-457200">
+              <a:buFont typeface="+mj-lt"/>
+              <a:buAutoNum type="arabicPeriod"/>
+            </a:pPr>
+            <a:endParaRPr lang="hu-HU" sz="2400" dirty="0">
+              <a:solidFill>
+                <a:srgbClr val="FFFF00"/>
+              </a:solidFill>
+              <a:latin typeface="Impact" panose="020B0806030902050204" pitchFamily="34" charset="0"/>
+            </a:endParaRPr>
+          </a:p>
+          <a:p>
+            <a:pPr marL="457200" indent="-457200">
+              <a:buFont typeface="+mj-lt"/>
+              <a:buAutoNum type="arabicPeriod"/>
+            </a:pPr>
+            <a:r>
+              <a:rPr lang="hu-HU" sz="2400" dirty="0">
+                <a:solidFill>
+                  <a:srgbClr val="FFFF00"/>
+                </a:solidFill>
+                <a:latin typeface="Impact" panose="020B0806030902050204" pitchFamily="34" charset="0"/>
+              </a:rPr>
+              <a:t>Számológép átalakítása úgy, hogy tudjon negatív számokkal is számolni</a:t>
+            </a:r>
+          </a:p>
+          <a:p>
+            <a:pPr marL="457200" indent="-457200">
+              <a:buFont typeface="+mj-lt"/>
+              <a:buAutoNum type="arabicPeriod"/>
+            </a:pPr>
+            <a:endParaRPr lang="hu-HU" sz="2400" dirty="0">
+              <a:solidFill>
+                <a:srgbClr val="FFFF00"/>
+              </a:solidFill>
+              <a:latin typeface="Impact" panose="020B0806030902050204" pitchFamily="34" charset="0"/>
+            </a:endParaRPr>
+          </a:p>
+          <a:p>
+            <a:pPr marL="457200" indent="-457200">
+              <a:buFont typeface="+mj-lt"/>
+              <a:buAutoNum type="arabicPeriod"/>
+            </a:pPr>
+            <a:r>
+              <a:rPr lang="hu-HU" sz="2400" dirty="0">
+                <a:solidFill>
+                  <a:srgbClr val="FFFF00"/>
+                </a:solidFill>
+                <a:latin typeface="Impact" panose="020B0806030902050204" pitchFamily="34" charset="0"/>
+              </a:rPr>
+              <a:t>Megcsinálni rendesen az új adatfelvételnél az időzónákat, hogy a magyarországi pontos idővel rögzítse az új adatot</a:t>
+            </a:r>
+          </a:p>
+        </p:txBody>
+      </p:sp>
+    </p:spTree>
+    <p:extLst>
+      <p:ext uri="{BB962C8B-B14F-4D97-AF65-F5344CB8AC3E}">
+        <p14:creationId xmlns:p14="http://schemas.microsoft.com/office/powerpoint/2010/main" val="526122264"/>
+      </p:ext>
+    </p:extLst>
+  </p:cSld>
+  <p:clrMapOvr>
+    <a:masterClrMapping/>
+  </p:clrMapOvr>
+</p:sld>
+</file>
+
+<file path=ppt/slides/slide23.xml><?xml version="1.0" encoding="utf-8"?>
+<p:sld xmlns:a="http://schemas.openxmlformats.org/drawingml/2006/main" xmlns:r="http://schemas.openxmlformats.org/officeDocument/2006/relationships" xmlns:p="http://schemas.openxmlformats.org/presentationml/2006/main">
+  <p:cSld>
+    <p:spTree>
+      <p:nvGrpSpPr>
+        <p:cNvPr id="1" name=""/>
+        <p:cNvGrpSpPr/>
+        <p:nvPr/>
+      </p:nvGrpSpPr>
+      <p:grpSpPr>
+        <a:xfrm>
+          <a:off x="0" y="0"/>
+          <a:ext cx="0" cy="0"/>
+          <a:chOff x="0" y="0"/>
+          <a:chExt cx="0" cy="0"/>
+        </a:xfrm>
+      </p:grpSpPr>
+      <p:pic>
+        <p:nvPicPr>
+          <p:cNvPr id="4" name="Picture 2" descr="money Archívum - Ingyenes Angol online nyelvtanulás minden nap">
+            <a:extLst>
+              <a:ext uri="{FF2B5EF4-FFF2-40B4-BE49-F238E27FC236}">
+                <a16:creationId xmlns:a16="http://schemas.microsoft.com/office/drawing/2014/main" id="{E80B3483-DA4E-50F4-FECA-DC7CC2327899}"/>
+              </a:ext>
+            </a:extLst>
+          </p:cNvPr>
+          <p:cNvPicPr>
+            <a:picLocks noChangeAspect="1" noChangeArrowheads="1"/>
+          </p:cNvPicPr>
+          <p:nvPr/>
+        </p:nvPicPr>
+        <p:blipFill>
+          <a:blip r:embed="rId2">
+            <a:extLst>
+              <a:ext uri="{28A0092B-C50C-407E-A947-70E740481C1C}">
+                <a14:useLocalDpi xmlns:a14="http://schemas.microsoft.com/office/drawing/2010/main" val="0"/>
+              </a:ext>
+            </a:extLst>
+          </a:blip>
+          <a:srcRect/>
+          <a:stretch>
+            <a:fillRect/>
+          </a:stretch>
+        </p:blipFill>
+        <p:spPr bwMode="auto">
+          <a:xfrm>
+            <a:off x="0" y="2507"/>
+            <a:ext cx="12192000" cy="6855493"/>
+          </a:xfrm>
+          <a:prstGeom prst="rect">
+            <a:avLst/>
+          </a:prstGeom>
+          <a:noFill/>
+          <a:extLst>
+            <a:ext uri="{909E8E84-426E-40DD-AFC4-6F175D3DCCD1}">
+              <a14:hiddenFill xmlns:a14="http://schemas.microsoft.com/office/drawing/2010/main">
+                <a:solidFill>
+                  <a:srgbClr val="FFFFFF"/>
+                </a:solidFill>
+              </a14:hiddenFill>
+            </a:ext>
+          </a:extLst>
+        </p:spPr>
+      </p:pic>
+      <p:sp>
+        <p:nvSpPr>
+          <p:cNvPr id="6" name="Szövegdoboz 5">
+            <a:extLst>
+              <a:ext uri="{FF2B5EF4-FFF2-40B4-BE49-F238E27FC236}">
+                <a16:creationId xmlns:a16="http://schemas.microsoft.com/office/drawing/2014/main" id="{7C8C4AC6-9E15-F9F6-34E5-072CDA15A0D3}"/>
+              </a:ext>
+            </a:extLst>
+          </p:cNvPr>
+          <p:cNvSpPr txBox="1"/>
+          <p:nvPr/>
+        </p:nvSpPr>
+        <p:spPr>
+          <a:xfrm>
+            <a:off x="6905625" y="3829049"/>
+            <a:ext cx="8982075" cy="584775"/>
+          </a:xfrm>
+          <a:prstGeom prst="rect">
+            <a:avLst/>
+          </a:prstGeom>
+          <a:noFill/>
+        </p:spPr>
+        <p:txBody>
+          <a:bodyPr wrap="square" rtlCol="0">
+            <a:spAutoFit/>
+          </a:bodyPr>
+          <a:lstStyle/>
+          <a:p>
+            <a:r>
+              <a:rPr lang="hu-HU" sz="3200" dirty="0">
+                <a:solidFill>
+                  <a:srgbClr val="FFFF00"/>
+                </a:solidFill>
+                <a:latin typeface="Impact" panose="020B0806030902050204" pitchFamily="34" charset="0"/>
+              </a:rPr>
+              <a:t>Köszönjük a figyelmet!</a:t>
+            </a:r>
+          </a:p>
+        </p:txBody>
+      </p:sp>
+      <p:pic>
+        <p:nvPicPr>
+          <p:cNvPr id="1028" name="Picture 4" descr="What Programming Is Like (As a Job, As an Activity &amp; On Mondays) - Toggl  Blog">
+            <a:extLst>
+              <a:ext uri="{FF2B5EF4-FFF2-40B4-BE49-F238E27FC236}">
+                <a16:creationId xmlns:a16="http://schemas.microsoft.com/office/drawing/2014/main" id="{395740AF-100C-2BDA-C1A6-6AE1D38A617E}"/>
+              </a:ext>
+            </a:extLst>
+          </p:cNvPr>
+          <p:cNvPicPr>
+            <a:picLocks noChangeAspect="1" noChangeArrowheads="1"/>
+          </p:cNvPicPr>
+          <p:nvPr/>
+        </p:nvPicPr>
+        <p:blipFill>
+          <a:blip r:embed="rId3">
+            <a:extLst>
+              <a:ext uri="{28A0092B-C50C-407E-A947-70E740481C1C}">
+                <a14:useLocalDpi xmlns:a14="http://schemas.microsoft.com/office/drawing/2010/main" val="0"/>
+              </a:ext>
+            </a:extLst>
+          </a:blip>
+          <a:srcRect/>
+          <a:stretch>
+            <a:fillRect/>
+          </a:stretch>
+        </p:blipFill>
+        <p:spPr bwMode="auto">
+          <a:xfrm>
+            <a:off x="475343" y="1783671"/>
+            <a:ext cx="5752420" cy="4675532"/>
+          </a:xfrm>
+          <a:prstGeom prst="rect">
+            <a:avLst/>
+          </a:prstGeom>
+          <a:noFill/>
+          <a:extLst>
+            <a:ext uri="{909E8E84-426E-40DD-AFC4-6F175D3DCCD1}">
+              <a14:hiddenFill xmlns:a14="http://schemas.microsoft.com/office/drawing/2010/main">
+                <a:solidFill>
+                  <a:srgbClr val="FFFFFF"/>
+                </a:solidFill>
+              </a14:hiddenFill>
+            </a:ext>
+          </a:extLst>
+        </p:spPr>
+      </p:pic>
+    </p:spTree>
+    <p:extLst>
+      <p:ext uri="{BB962C8B-B14F-4D97-AF65-F5344CB8AC3E}">
+        <p14:creationId xmlns:p14="http://schemas.microsoft.com/office/powerpoint/2010/main" val="1492010837"/>
       </p:ext>
     </p:extLst>
   </p:cSld>
@@ -4334,7 +7644,7 @@
             <a:r>
               <a:rPr lang="hu-HU" sz="3600" dirty="0">
                 <a:solidFill>
-                  <a:srgbClr val="00B050"/>
+                  <a:srgbClr val="FFFF00"/>
                 </a:solidFill>
                 <a:latin typeface="Impact" panose="020B0806030902050204" pitchFamily="34" charset="0"/>
               </a:rPr>
@@ -4342,7 +7652,7 @@
             </a:r>
             <a:endParaRPr lang="hu-HU" sz="3600" dirty="0">
               <a:solidFill>
-                <a:srgbClr val="00B050"/>
+                <a:srgbClr val="FFFF00"/>
               </a:solidFill>
             </a:endParaRPr>
           </a:p>
@@ -4456,7 +7766,7 @@
             <a:r>
               <a:rPr lang="hu-HU" sz="3600" dirty="0">
                 <a:solidFill>
-                  <a:srgbClr val="00B050"/>
+                  <a:srgbClr val="FFFF00"/>
                 </a:solidFill>
                 <a:latin typeface="Impact" panose="020B0806030902050204" pitchFamily="34" charset="0"/>
               </a:rPr>
@@ -4516,7 +7826,7 @@
               <a:r>
                 <a:rPr lang="hu-HU" sz="2800" dirty="0">
                   <a:solidFill>
-                    <a:srgbClr val="00B050"/>
+                    <a:srgbClr val="FFFF00"/>
                   </a:solidFill>
                   <a:latin typeface="Impact" panose="020B0806030902050204" pitchFamily="34" charset="0"/>
                 </a:rPr>
@@ -4717,7 +8027,7 @@
                 <a:r>
                   <a:rPr lang="hu-HU" sz="2800" dirty="0">
                     <a:solidFill>
-                      <a:srgbClr val="00B050"/>
+                      <a:srgbClr val="FFFF00"/>
                     </a:solidFill>
                     <a:latin typeface="Impact" panose="020B0806030902050204" pitchFamily="34" charset="0"/>
                   </a:rPr>
@@ -4878,7 +8188,7 @@
               <a:r>
                 <a:rPr lang="hu-HU" sz="2800" dirty="0">
                   <a:solidFill>
-                    <a:srgbClr val="00B050"/>
+                    <a:srgbClr val="FFFF00"/>
                   </a:solidFill>
                   <a:latin typeface="Impact" panose="020B0806030902050204" pitchFamily="34" charset="0"/>
                 </a:rPr>
@@ -5093,7 +8403,7 @@
         </p:blipFill>
         <p:spPr bwMode="auto">
           <a:xfrm>
-            <a:off x="1" y="2507"/>
+            <a:off x="0" y="0"/>
             <a:ext cx="12192000" cy="6855493"/>
           </a:xfrm>
           <a:prstGeom prst="rect">
@@ -5142,7 +8452,7 @@
             <a:r>
               <a:rPr lang="hu-HU" sz="3600" dirty="0">
                 <a:solidFill>
-                  <a:srgbClr val="00B050"/>
+                  <a:srgbClr val="FFFF00"/>
                 </a:solidFill>
                 <a:latin typeface="Impact" panose="020B0806030902050204" pitchFamily="34" charset="0"/>
               </a:rPr>
@@ -5150,7 +8460,7 @@
             </a:r>
             <a:endParaRPr lang="hu-HU" sz="1800" dirty="0">
               <a:solidFill>
-                <a:srgbClr val="00B050"/>
+                <a:srgbClr val="FFFF00"/>
               </a:solidFill>
               <a:latin typeface="Impact" panose="020B0806030902050204" pitchFamily="34" charset="0"/>
             </a:endParaRPr>
@@ -5185,7 +8495,7 @@
         </p:blipFill>
         <p:spPr>
           <a:xfrm>
-            <a:off x="999569" y="1957199"/>
+            <a:off x="965676" y="4091592"/>
             <a:ext cx="7964011" cy="2695951"/>
           </a:xfrm>
           <a:prstGeom prst="rect">
@@ -5193,6 +8503,120 @@
           </a:prstGeom>
         </p:spPr>
       </p:pic>
+      <p:sp>
+        <p:nvSpPr>
+          <p:cNvPr id="3" name="Szövegdoboz 2">
+            <a:extLst>
+              <a:ext uri="{FF2B5EF4-FFF2-40B4-BE49-F238E27FC236}">
+                <a16:creationId xmlns:a16="http://schemas.microsoft.com/office/drawing/2014/main" id="{7A7984AA-5250-F1EC-8419-D421CD32494B}"/>
+              </a:ext>
+            </a:extLst>
+          </p:cNvPr>
+          <p:cNvSpPr txBox="1"/>
+          <p:nvPr/>
+        </p:nvSpPr>
+        <p:spPr>
+          <a:xfrm>
+            <a:off x="965676" y="1802452"/>
+            <a:ext cx="10939463" cy="2492990"/>
+          </a:xfrm>
+          <a:prstGeom prst="rect">
+            <a:avLst/>
+          </a:prstGeom>
+          <a:noFill/>
+        </p:spPr>
+        <p:txBody>
+          <a:bodyPr wrap="square" rtlCol="0">
+            <a:spAutoFit/>
+          </a:bodyPr>
+          <a:lstStyle/>
+          <a:p>
+            <a:pPr marL="285750" indent="-285750">
+              <a:buFont typeface="Arial" panose="020B0604020202020204" pitchFamily="34" charset="0"/>
+              <a:buChar char="•"/>
+            </a:pPr>
+            <a:r>
+              <a:rPr lang="hu-HU" sz="2400" dirty="0">
+                <a:solidFill>
+                  <a:srgbClr val="FFFF00"/>
+                </a:solidFill>
+                <a:latin typeface="Impact" panose="020B0806030902050204" pitchFamily="34" charset="0"/>
+              </a:rPr>
+              <a:t>Bejelentkezésnél a legelején, amíg nem hoztunk létre új </a:t>
+            </a:r>
+            <a:r>
+              <a:rPr lang="hu-HU" sz="2400" dirty="0" err="1">
+                <a:solidFill>
+                  <a:srgbClr val="FFFF00"/>
+                </a:solidFill>
+                <a:latin typeface="Impact" panose="020B0806030902050204" pitchFamily="34" charset="0"/>
+              </a:rPr>
+              <a:t>felhasználót,addig</a:t>
+            </a:r>
+            <a:r>
+              <a:rPr lang="hu-HU" sz="2400" dirty="0">
+                <a:solidFill>
+                  <a:srgbClr val="FFFF00"/>
+                </a:solidFill>
+                <a:latin typeface="Impact" panose="020B0806030902050204" pitchFamily="34" charset="0"/>
+              </a:rPr>
+              <a:t> csak az admin felhasználóval lehet belépni</a:t>
+            </a:r>
+          </a:p>
+          <a:p>
+            <a:pPr marL="285750" indent="-285750">
+              <a:buFont typeface="Arial" panose="020B0604020202020204" pitchFamily="34" charset="0"/>
+              <a:buChar char="•"/>
+            </a:pPr>
+            <a:endParaRPr lang="hu-HU" sz="2400" dirty="0">
+              <a:solidFill>
+                <a:srgbClr val="FFFF00"/>
+              </a:solidFill>
+              <a:latin typeface="Impact" panose="020B0806030902050204" pitchFamily="34" charset="0"/>
+            </a:endParaRPr>
+          </a:p>
+          <a:p>
+            <a:pPr marL="285750" indent="-285750">
+              <a:buFont typeface="Arial" panose="020B0604020202020204" pitchFamily="34" charset="0"/>
+              <a:buChar char="•"/>
+            </a:pPr>
+            <a:r>
+              <a:rPr lang="hu-HU" sz="2400" dirty="0">
+                <a:solidFill>
+                  <a:srgbClr val="FFFF00"/>
+                </a:solidFill>
+                <a:latin typeface="Impact" panose="020B0806030902050204" pitchFamily="34" charset="0"/>
+              </a:rPr>
+              <a:t>A fiókok le  vannak védve jelszóval, így egy felhasználó csak a saját fiókjában tud adatokat felvenni, természetesen csak sikeres bejelentkezés után</a:t>
+            </a:r>
+            <a:endParaRPr lang="hu-HU" sz="2000" dirty="0">
+              <a:solidFill>
+                <a:srgbClr val="FFFF00"/>
+              </a:solidFill>
+              <a:latin typeface="Impact" panose="020B0806030902050204" pitchFamily="34" charset="0"/>
+            </a:endParaRPr>
+          </a:p>
+          <a:p>
+            <a:pPr marL="285750" indent="-285750">
+              <a:buFont typeface="Arial" panose="020B0604020202020204" pitchFamily="34" charset="0"/>
+              <a:buChar char="•"/>
+            </a:pPr>
+            <a:endParaRPr lang="hu-HU" dirty="0">
+              <a:solidFill>
+                <a:srgbClr val="00B050"/>
+              </a:solidFill>
+              <a:latin typeface="Impact" panose="020B0806030902050204" pitchFamily="34" charset="0"/>
+            </a:endParaRPr>
+          </a:p>
+          <a:p>
+            <a:pPr marL="285750" indent="-285750">
+              <a:buFont typeface="Arial" panose="020B0604020202020204" pitchFamily="34" charset="0"/>
+              <a:buChar char="•"/>
+            </a:pPr>
+            <a:endParaRPr lang="hu-HU" dirty="0"/>
+          </a:p>
+        </p:txBody>
+      </p:sp>
     </p:spTree>
     <p:extLst>
       <p:ext uri="{BB962C8B-B14F-4D97-AF65-F5344CB8AC3E}">
@@ -5275,7 +8699,7 @@
           <p:cNvPr id="7" name="Szövegdoboz 6">
             <a:extLst>
               <a:ext uri="{FF2B5EF4-FFF2-40B4-BE49-F238E27FC236}">
-                <a16:creationId xmlns:a16="http://schemas.microsoft.com/office/drawing/2014/main" id="{0C04447B-809F-4B6E-850A-3C1CDB266040}"/>
+                <a16:creationId xmlns:a16="http://schemas.microsoft.com/office/drawing/2014/main" id="{D37EA65A-C486-42F5-AECD-B65C12250D36}"/>
               </a:ext>
             </a:extLst>
           </p:cNvPr>
@@ -5284,8 +8708,8 @@
         </p:nvSpPr>
         <p:spPr>
           <a:xfrm>
-            <a:off x="1152524" y="644009"/>
-            <a:ext cx="8505826" cy="646331"/>
+            <a:off x="919163" y="432569"/>
+            <a:ext cx="8710612" cy="646331"/>
           </a:xfrm>
           <a:prstGeom prst="rect">
             <a:avLst/>
@@ -5301,21 +8725,27 @@
             <a:r>
               <a:rPr lang="hu-HU" sz="3600" dirty="0">
                 <a:solidFill>
-                  <a:srgbClr val="00B050"/>
+                  <a:srgbClr val="FFFF00"/>
                 </a:solidFill>
                 <a:latin typeface="Impact" panose="020B0806030902050204" pitchFamily="34" charset="0"/>
               </a:rPr>
-              <a:t>Reszponzív web alkalmazás (irányítópult)</a:t>
-            </a:r>
+              <a:t>Reszponzív web alkalmazás (regisztráció)</a:t>
+            </a:r>
+            <a:endParaRPr lang="hu-HU" sz="1800" dirty="0">
+              <a:solidFill>
+                <a:srgbClr val="FFFF00"/>
+              </a:solidFill>
+              <a:latin typeface="Impact" panose="020B0806030902050204" pitchFamily="34" charset="0"/>
+            </a:endParaRPr>
           </a:p>
         </p:txBody>
       </p:sp>
       <p:pic>
         <p:nvPicPr>
-          <p:cNvPr id="10" name="Kép 9">
-            <a:extLst>
-              <a:ext uri="{FF2B5EF4-FFF2-40B4-BE49-F238E27FC236}">
-                <a16:creationId xmlns:a16="http://schemas.microsoft.com/office/drawing/2014/main" id="{B5F27D14-138D-49C9-8BE3-35069EBA6A00}"/>
+          <p:cNvPr id="3" name="Kép 2">
+            <a:extLst>
+              <a:ext uri="{FF2B5EF4-FFF2-40B4-BE49-F238E27FC236}">
+                <a16:creationId xmlns:a16="http://schemas.microsoft.com/office/drawing/2014/main" id="{674E736A-AE20-2FB6-B67E-A9BF284C8A9F}"/>
               </a:ext>
             </a:extLst>
           </p:cNvPr>
@@ -5325,25 +8755,89 @@
           <p:nvPr/>
         </p:nvPicPr>
         <p:blipFill>
-          <a:blip r:embed="rId3"/>
+          <a:blip r:embed="rId3">
+            <a:extLst>
+              <a:ext uri="{28A0092B-C50C-407E-A947-70E740481C1C}">
+                <a14:useLocalDpi xmlns:a14="http://schemas.microsoft.com/office/drawing/2010/main" val="0"/>
+              </a:ext>
+            </a:extLst>
+          </a:blip>
           <a:stretch>
             <a:fillRect/>
           </a:stretch>
         </p:blipFill>
         <p:spPr>
           <a:xfrm>
-            <a:off x="700087" y="1290340"/>
-            <a:ext cx="10982325" cy="5321983"/>
+            <a:off x="1004888" y="2976463"/>
+            <a:ext cx="9234216" cy="3614365"/>
           </a:xfrm>
           <a:prstGeom prst="rect">
             <a:avLst/>
           </a:prstGeom>
         </p:spPr>
       </p:pic>
+      <p:sp>
+        <p:nvSpPr>
+          <p:cNvPr id="4" name="Szövegdoboz 3">
+            <a:extLst>
+              <a:ext uri="{FF2B5EF4-FFF2-40B4-BE49-F238E27FC236}">
+                <a16:creationId xmlns:a16="http://schemas.microsoft.com/office/drawing/2014/main" id="{9375A2DD-1622-434E-566D-512C9172AC85}"/>
+              </a:ext>
+            </a:extLst>
+          </p:cNvPr>
+          <p:cNvSpPr txBox="1"/>
+          <p:nvPr/>
+        </p:nvSpPr>
+        <p:spPr>
+          <a:xfrm>
+            <a:off x="919163" y="1422004"/>
+            <a:ext cx="9891712" cy="1200329"/>
+          </a:xfrm>
+          <a:prstGeom prst="rect">
+            <a:avLst/>
+          </a:prstGeom>
+          <a:noFill/>
+        </p:spPr>
+        <p:txBody>
+          <a:bodyPr wrap="square" rtlCol="0">
+            <a:spAutoFit/>
+          </a:bodyPr>
+          <a:lstStyle/>
+          <a:p>
+            <a:r>
+              <a:rPr lang="hu-HU" sz="2400" dirty="0">
+                <a:solidFill>
+                  <a:srgbClr val="FFFF00"/>
+                </a:solidFill>
+                <a:latin typeface="Impact" panose="020B0806030902050204" pitchFamily="34" charset="0"/>
+              </a:rPr>
+              <a:t>Ha új fiókot szeretnénk létrehozni, akkor a regisztrációhoz kell navigálni, amint a helyes adatokat beírtuk, úgy a </a:t>
+            </a:r>
+            <a:r>
+              <a:rPr lang="hu-HU" sz="2400" dirty="0" err="1">
+                <a:solidFill>
+                  <a:srgbClr val="FFFF00"/>
+                </a:solidFill>
+                <a:latin typeface="Impact" panose="020B0806030902050204" pitchFamily="34" charset="0"/>
+              </a:rPr>
+              <a:t>Register</a:t>
+            </a:r>
+            <a:r>
+              <a:rPr lang="hu-HU" sz="2400" dirty="0">
+                <a:solidFill>
+                  <a:srgbClr val="FFFF00"/>
+                </a:solidFill>
+                <a:latin typeface="Impact" panose="020B0806030902050204" pitchFamily="34" charset="0"/>
+              </a:rPr>
+              <a:t> gomb át is irányít minket az újonnan regisztrált fiókunk irányítópultjára</a:t>
+            </a:r>
+          </a:p>
+        </p:txBody>
+      </p:sp>
     </p:spTree>
     <p:extLst>
       <p:ext uri="{BB962C8B-B14F-4D97-AF65-F5344CB8AC3E}">
-        <p14:creationId xmlns:p14="http://schemas.microsoft.com/office/powerpoint/2010/main" val="2847873464"/>
+        <p14:creationId xmlns:p14="http://schemas.microsoft.com/office/powerpoint/2010/main" val="1566996067"/>
       </p:ext>
     </p:extLst>
   </p:cSld>
@@ -5422,7 +8916,7 @@
           <p:cNvPr id="7" name="Szövegdoboz 6">
             <a:extLst>
               <a:ext uri="{FF2B5EF4-FFF2-40B4-BE49-F238E27FC236}">
-                <a16:creationId xmlns:a16="http://schemas.microsoft.com/office/drawing/2014/main" id="{199607A2-20D7-4481-9176-2F6C2A672F52}"/>
+                <a16:creationId xmlns:a16="http://schemas.microsoft.com/office/drawing/2014/main" id="{0C04447B-809F-4B6E-850A-3C1CDB266040}"/>
               </a:ext>
             </a:extLst>
           </p:cNvPr>
@@ -5431,8 +8925,8 @@
         </p:nvSpPr>
         <p:spPr>
           <a:xfrm>
-            <a:off x="900112" y="609600"/>
-            <a:ext cx="7915275" cy="646331"/>
+            <a:off x="1152524" y="644009"/>
+            <a:ext cx="8505826" cy="646331"/>
           </a:xfrm>
           <a:prstGeom prst="rect">
             <a:avLst/>
@@ -5448,21 +8942,21 @@
             <a:r>
               <a:rPr lang="hu-HU" sz="3600" dirty="0">
                 <a:solidFill>
-                  <a:srgbClr val="00B050"/>
+                  <a:srgbClr val="FFFF00"/>
                 </a:solidFill>
                 <a:latin typeface="Impact" panose="020B0806030902050204" pitchFamily="34" charset="0"/>
               </a:rPr>
-              <a:t>Reszponzív web alkalmazás (bevételek)</a:t>
+              <a:t>Reszponzív web alkalmazás (irányítópult)</a:t>
             </a:r>
           </a:p>
         </p:txBody>
       </p:sp>
       <p:pic>
         <p:nvPicPr>
-          <p:cNvPr id="8" name="Kép 7">
-            <a:extLst>
-              <a:ext uri="{FF2B5EF4-FFF2-40B4-BE49-F238E27FC236}">
-                <a16:creationId xmlns:a16="http://schemas.microsoft.com/office/drawing/2014/main" id="{772823FE-A454-4EAA-A3D5-EC9F74F4EF52}"/>
+          <p:cNvPr id="10" name="Kép 9">
+            <a:extLst>
+              <a:ext uri="{FF2B5EF4-FFF2-40B4-BE49-F238E27FC236}">
+                <a16:creationId xmlns:a16="http://schemas.microsoft.com/office/drawing/2014/main" id="{B5F27D14-138D-49C9-8BE3-35069EBA6A00}"/>
               </a:ext>
             </a:extLst>
           </p:cNvPr>
@@ -5479,18 +8973,100 @@
         </p:blipFill>
         <p:spPr>
           <a:xfrm>
-            <a:off x="942975" y="1375707"/>
-            <a:ext cx="10096500" cy="4945547"/>
+            <a:off x="4007746" y="1552574"/>
+            <a:ext cx="8027091" cy="3889891"/>
           </a:xfrm>
           <a:prstGeom prst="rect">
             <a:avLst/>
           </a:prstGeom>
         </p:spPr>
       </p:pic>
+      <p:sp>
+        <p:nvSpPr>
+          <p:cNvPr id="2" name="Szövegdoboz 1">
+            <a:extLst>
+              <a:ext uri="{FF2B5EF4-FFF2-40B4-BE49-F238E27FC236}">
+                <a16:creationId xmlns:a16="http://schemas.microsoft.com/office/drawing/2014/main" id="{167CF0DE-325D-4B5C-1FAA-BB79DD7327DD}"/>
+              </a:ext>
+            </a:extLst>
+          </p:cNvPr>
+          <p:cNvSpPr txBox="1"/>
+          <p:nvPr/>
+        </p:nvSpPr>
+        <p:spPr>
+          <a:xfrm>
+            <a:off x="223838" y="2048024"/>
+            <a:ext cx="3850583" cy="3046988"/>
+          </a:xfrm>
+          <a:prstGeom prst="rect">
+            <a:avLst/>
+          </a:prstGeom>
+          <a:noFill/>
+        </p:spPr>
+        <p:txBody>
+          <a:bodyPr wrap="square" rtlCol="0">
+            <a:spAutoFit/>
+          </a:bodyPr>
+          <a:lstStyle/>
+          <a:p>
+            <a:pPr marL="342900" indent="-342900">
+              <a:buFont typeface="Arial" panose="020B0604020202020204" pitchFamily="34" charset="0"/>
+              <a:buChar char="•"/>
+            </a:pPr>
+            <a:r>
+              <a:rPr lang="hu-HU" sz="2400" dirty="0">
+                <a:solidFill>
+                  <a:srgbClr val="FFFF00"/>
+                </a:solidFill>
+                <a:latin typeface="Impact" panose="020B0806030902050204" pitchFamily="34" charset="0"/>
+              </a:rPr>
+              <a:t>Itt láthatjuk az e havi</a:t>
+            </a:r>
+          </a:p>
+          <a:p>
+            <a:r>
+              <a:rPr lang="hu-HU" sz="2400" dirty="0">
+                <a:solidFill>
+                  <a:srgbClr val="FFFF00"/>
+                </a:solidFill>
+                <a:latin typeface="Impact" panose="020B0806030902050204" pitchFamily="34" charset="0"/>
+              </a:rPr>
+              <a:t>összesített költségeket, kiadásokat és az egyenleget</a:t>
+            </a:r>
+          </a:p>
+          <a:p>
+            <a:pPr marL="342900" indent="-342900">
+              <a:buFont typeface="Arial" panose="020B0604020202020204" pitchFamily="34" charset="0"/>
+              <a:buChar char="•"/>
+            </a:pPr>
+            <a:endParaRPr lang="hu-HU" sz="2400" dirty="0">
+              <a:solidFill>
+                <a:srgbClr val="FFFF00"/>
+              </a:solidFill>
+              <a:latin typeface="Impact" panose="020B0806030902050204" pitchFamily="34" charset="0"/>
+            </a:endParaRPr>
+          </a:p>
+          <a:p>
+            <a:pPr marL="342900" indent="-342900">
+              <a:buFont typeface="Arial" panose="020B0604020202020204" pitchFamily="34" charset="0"/>
+              <a:buChar char="•"/>
+            </a:pPr>
+            <a:r>
+              <a:rPr lang="hu-HU" sz="2400" dirty="0">
+                <a:solidFill>
+                  <a:srgbClr val="FFFF00"/>
+                </a:solidFill>
+                <a:latin typeface="Impact" panose="020B0806030902050204" pitchFamily="34" charset="0"/>
+              </a:rPr>
+              <a:t>Fent a jobb sarokban látjuk, ki van bejelentkezve, és itt is tudunk kijelentkezni</a:t>
+            </a:r>
+          </a:p>
+        </p:txBody>
+      </p:sp>
     </p:spTree>
     <p:extLst>
       <p:ext uri="{BB962C8B-B14F-4D97-AF65-F5344CB8AC3E}">
-        <p14:creationId xmlns:p14="http://schemas.microsoft.com/office/powerpoint/2010/main" val="3989958821"/>
+        <p14:creationId xmlns:p14="http://schemas.microsoft.com/office/powerpoint/2010/main" val="2847873464"/>
       </p:ext>
     </p:extLst>
   </p:cSld>
@@ -5569,7 +9145,7 @@
           <p:cNvPr id="7" name="Szövegdoboz 6">
             <a:extLst>
               <a:ext uri="{FF2B5EF4-FFF2-40B4-BE49-F238E27FC236}">
-                <a16:creationId xmlns:a16="http://schemas.microsoft.com/office/drawing/2014/main" id="{8BC3C534-D40B-45D0-9E01-10168D2DD030}"/>
+                <a16:creationId xmlns:a16="http://schemas.microsoft.com/office/drawing/2014/main" id="{0C04447B-809F-4B6E-850A-3C1CDB266040}"/>
               </a:ext>
             </a:extLst>
           </p:cNvPr>
@@ -5578,8 +9154,8 @@
         </p:nvSpPr>
         <p:spPr>
           <a:xfrm>
-            <a:off x="814387" y="624960"/>
-            <a:ext cx="7824788" cy="646331"/>
+            <a:off x="1152524" y="644009"/>
+            <a:ext cx="8505826" cy="646331"/>
           </a:xfrm>
           <a:prstGeom prst="rect">
             <a:avLst/>
@@ -5595,21 +9171,21 @@
             <a:r>
               <a:rPr lang="hu-HU" sz="3600" dirty="0">
                 <a:solidFill>
-                  <a:srgbClr val="00B050"/>
+                  <a:srgbClr val="FFFF00"/>
                 </a:solidFill>
                 <a:latin typeface="Impact" panose="020B0806030902050204" pitchFamily="34" charset="0"/>
               </a:rPr>
-              <a:t>Reszponzív web alkalmazás (kiadások)</a:t>
+              <a:t>Reszponzív web alkalmazás (számológép)</a:t>
             </a:r>
           </a:p>
         </p:txBody>
       </p:sp>
       <p:pic>
         <p:nvPicPr>
-          <p:cNvPr id="8" name="Kép 7">
-            <a:extLst>
-              <a:ext uri="{FF2B5EF4-FFF2-40B4-BE49-F238E27FC236}">
-                <a16:creationId xmlns:a16="http://schemas.microsoft.com/office/drawing/2014/main" id="{380F6BFE-609B-42B5-BDF7-5DC5E957D48E}"/>
+          <p:cNvPr id="3" name="Kép 2">
+            <a:extLst>
+              <a:ext uri="{FF2B5EF4-FFF2-40B4-BE49-F238E27FC236}">
+                <a16:creationId xmlns:a16="http://schemas.microsoft.com/office/drawing/2014/main" id="{A2927AFE-E8F4-980F-92F4-3395F50038D9}"/>
               </a:ext>
             </a:extLst>
           </p:cNvPr>
@@ -5632,18 +9208,128 @@
         </p:blipFill>
         <p:spPr>
           <a:xfrm>
-            <a:off x="814387" y="1392758"/>
-            <a:ext cx="10263188" cy="5018871"/>
+            <a:off x="8786588" y="1797358"/>
+            <a:ext cx="3210373" cy="4820323"/>
           </a:xfrm>
           <a:prstGeom prst="rect">
             <a:avLst/>
           </a:prstGeom>
         </p:spPr>
       </p:pic>
+      <p:sp>
+        <p:nvSpPr>
+          <p:cNvPr id="4" name="Szövegdoboz 3">
+            <a:extLst>
+              <a:ext uri="{FF2B5EF4-FFF2-40B4-BE49-F238E27FC236}">
+                <a16:creationId xmlns:a16="http://schemas.microsoft.com/office/drawing/2014/main" id="{E7E53AB0-FD7F-A92D-D072-8811726BC903}"/>
+              </a:ext>
+            </a:extLst>
+          </p:cNvPr>
+          <p:cNvSpPr txBox="1"/>
+          <p:nvPr/>
+        </p:nvSpPr>
+        <p:spPr>
+          <a:xfrm>
+            <a:off x="1152524" y="2090172"/>
+            <a:ext cx="7300689" cy="2677656"/>
+          </a:xfrm>
+          <a:prstGeom prst="rect">
+            <a:avLst/>
+          </a:prstGeom>
+          <a:noFill/>
+        </p:spPr>
+        <p:txBody>
+          <a:bodyPr wrap="square" rtlCol="0">
+            <a:spAutoFit/>
+          </a:bodyPr>
+          <a:lstStyle/>
+          <a:p>
+            <a:pPr marL="342900" indent="-342900">
+              <a:buFont typeface="Arial" panose="020B0604020202020204" pitchFamily="34" charset="0"/>
+              <a:buChar char="•"/>
+            </a:pPr>
+            <a:r>
+              <a:rPr lang="hu-HU" sz="2400" dirty="0">
+                <a:solidFill>
+                  <a:srgbClr val="FFFF00"/>
+                </a:solidFill>
+                <a:latin typeface="Impact" panose="020B0806030902050204" pitchFamily="34" charset="0"/>
+              </a:rPr>
+              <a:t>A számológép csak a 4 alapműveletet tudja elvégezni</a:t>
+            </a:r>
+          </a:p>
+          <a:p>
+            <a:pPr marL="342900" indent="-342900">
+              <a:buFont typeface="Arial" panose="020B0604020202020204" pitchFamily="34" charset="0"/>
+              <a:buChar char="•"/>
+            </a:pPr>
+            <a:endParaRPr lang="hu-HU" sz="2400" dirty="0">
+              <a:solidFill>
+                <a:srgbClr val="FFFF00"/>
+              </a:solidFill>
+              <a:latin typeface="Impact" panose="020B0806030902050204" pitchFamily="34" charset="0"/>
+            </a:endParaRPr>
+          </a:p>
+          <a:p>
+            <a:pPr marL="342900" indent="-342900">
+              <a:buFont typeface="Arial" panose="020B0604020202020204" pitchFamily="34" charset="0"/>
+              <a:buChar char="•"/>
+            </a:pPr>
+            <a:r>
+              <a:rPr lang="hu-HU" sz="2400" dirty="0">
+                <a:solidFill>
+                  <a:srgbClr val="FFFF00"/>
+                </a:solidFill>
+                <a:latin typeface="Impact" panose="020B0806030902050204" pitchFamily="34" charset="0"/>
+              </a:rPr>
+              <a:t>Tud racionális számokkal számolni</a:t>
+            </a:r>
+          </a:p>
+          <a:p>
+            <a:pPr marL="342900" indent="-342900">
+              <a:buFont typeface="Arial" panose="020B0604020202020204" pitchFamily="34" charset="0"/>
+              <a:buChar char="•"/>
+            </a:pPr>
+            <a:endParaRPr lang="hu-HU" sz="2400" dirty="0">
+              <a:solidFill>
+                <a:srgbClr val="FFFF00"/>
+              </a:solidFill>
+              <a:latin typeface="Impact" panose="020B0806030902050204" pitchFamily="34" charset="0"/>
+            </a:endParaRPr>
+          </a:p>
+          <a:p>
+            <a:pPr marL="342900" indent="-342900">
+              <a:buFont typeface="Arial" panose="020B0604020202020204" pitchFamily="34" charset="0"/>
+              <a:buChar char="•"/>
+            </a:pPr>
+            <a:r>
+              <a:rPr lang="hu-HU" sz="2400" dirty="0">
+                <a:solidFill>
+                  <a:srgbClr val="FFFF00"/>
+                </a:solidFill>
+                <a:latin typeface="Impact" panose="020B0806030902050204" pitchFamily="34" charset="0"/>
+              </a:rPr>
+              <a:t>Negatív számokat nem tud kezelni a számológép, azt csak a program tudja</a:t>
+            </a:r>
+          </a:p>
+          <a:p>
+            <a:pPr marL="342900" indent="-342900">
+              <a:buFont typeface="Arial" panose="020B0604020202020204" pitchFamily="34" charset="0"/>
+              <a:buChar char="•"/>
+            </a:pPr>
+            <a:endParaRPr lang="hu-HU" sz="2400" dirty="0">
+              <a:solidFill>
+                <a:srgbClr val="FFFF00"/>
+              </a:solidFill>
+              <a:latin typeface="Impact" panose="020B0806030902050204" pitchFamily="34" charset="0"/>
+            </a:endParaRPr>
+          </a:p>
+        </p:txBody>
+      </p:sp>
     </p:spTree>
     <p:extLst>
       <p:ext uri="{BB962C8B-B14F-4D97-AF65-F5344CB8AC3E}">
-        <p14:creationId xmlns:p14="http://schemas.microsoft.com/office/powerpoint/2010/main" val="2480642691"/>
+        <p14:creationId xmlns:p14="http://schemas.microsoft.com/office/powerpoint/2010/main" val="3215050067"/>
       </p:ext>
     </p:extLst>
   </p:cSld>
@@ -5719,10 +9405,10 @@
       </p:pic>
       <p:sp>
         <p:nvSpPr>
-          <p:cNvPr id="4" name="Szövegdoboz 3">
-            <a:extLst>
-              <a:ext uri="{FF2B5EF4-FFF2-40B4-BE49-F238E27FC236}">
-                <a16:creationId xmlns:a16="http://schemas.microsoft.com/office/drawing/2014/main" id="{D9680602-7B8F-4B6D-B76C-4A2160ADFC21}"/>
+          <p:cNvPr id="7" name="Szövegdoboz 6">
+            <a:extLst>
+              <a:ext uri="{FF2B5EF4-FFF2-40B4-BE49-F238E27FC236}">
+                <a16:creationId xmlns:a16="http://schemas.microsoft.com/office/drawing/2014/main" id="{199607A2-20D7-4481-9176-2F6C2A672F52}"/>
               </a:ext>
             </a:extLst>
           </p:cNvPr>
@@ -5731,8 +9417,8 @@
         </p:nvSpPr>
         <p:spPr>
           <a:xfrm>
-            <a:off x="1028700" y="619125"/>
-            <a:ext cx="9867900" cy="646331"/>
+            <a:off x="695324" y="619125"/>
+            <a:ext cx="7915275" cy="646331"/>
           </a:xfrm>
           <a:prstGeom prst="rect">
             <a:avLst/>
@@ -5748,21 +9434,21 @@
             <a:r>
               <a:rPr lang="hu-HU" sz="3600" dirty="0">
                 <a:solidFill>
-                  <a:srgbClr val="00B050"/>
+                  <a:srgbClr val="FFFF00"/>
                 </a:solidFill>
                 <a:latin typeface="Impact" panose="020B0806030902050204" pitchFamily="34" charset="0"/>
               </a:rPr>
-              <a:t>Reszponzív web alkalmazás (mindent összefoglaló)</a:t>
+              <a:t>Reszponzív web alkalmazás (bevételek)</a:t>
             </a:r>
           </a:p>
         </p:txBody>
       </p:sp>
       <p:pic>
         <p:nvPicPr>
-          <p:cNvPr id="9" name="Kép 8">
-            <a:extLst>
-              <a:ext uri="{FF2B5EF4-FFF2-40B4-BE49-F238E27FC236}">
-                <a16:creationId xmlns:a16="http://schemas.microsoft.com/office/drawing/2014/main" id="{6754EF42-9E9D-40CF-9808-7CBA09CF61C2}"/>
+          <p:cNvPr id="8" name="Kép 7">
+            <a:extLst>
+              <a:ext uri="{FF2B5EF4-FFF2-40B4-BE49-F238E27FC236}">
+                <a16:creationId xmlns:a16="http://schemas.microsoft.com/office/drawing/2014/main" id="{772823FE-A454-4EAA-A3D5-EC9F74F4EF52}"/>
               </a:ext>
             </a:extLst>
           </p:cNvPr>
@@ -5779,84 +9465,119 @@
         </p:blipFill>
         <p:spPr>
           <a:xfrm>
-            <a:off x="409461" y="1398029"/>
-            <a:ext cx="5219700" cy="2509262"/>
+            <a:off x="3352662" y="1514475"/>
+            <a:ext cx="8763138" cy="4292429"/>
           </a:xfrm>
           <a:prstGeom prst="rect">
             <a:avLst/>
           </a:prstGeom>
         </p:spPr>
       </p:pic>
-      <p:pic>
-        <p:nvPicPr>
-          <p:cNvPr id="11" name="Kép 10">
-            <a:extLst>
-              <a:ext uri="{FF2B5EF4-FFF2-40B4-BE49-F238E27FC236}">
-                <a16:creationId xmlns:a16="http://schemas.microsoft.com/office/drawing/2014/main" id="{BB1FD7AB-4BAE-4CBE-87D4-C44C6044B41E}"/>
-              </a:ext>
-            </a:extLst>
-          </p:cNvPr>
-          <p:cNvPicPr>
-            <a:picLocks noChangeAspect="1"/>
-          </p:cNvPicPr>
+      <p:sp>
+        <p:nvSpPr>
+          <p:cNvPr id="2" name="Szövegdoboz 1">
+            <a:extLst>
+              <a:ext uri="{FF2B5EF4-FFF2-40B4-BE49-F238E27FC236}">
+                <a16:creationId xmlns:a16="http://schemas.microsoft.com/office/drawing/2014/main" id="{92AC4767-AB4D-3204-5D31-36B77B6C5E65}"/>
+              </a:ext>
+            </a:extLst>
+          </p:cNvPr>
+          <p:cNvSpPr txBox="1"/>
           <p:nvPr/>
-        </p:nvPicPr>
-        <p:blipFill>
-          <a:blip r:embed="rId4"/>
-          <a:stretch>
-            <a:fillRect/>
-          </a:stretch>
-        </p:blipFill>
+        </p:nvSpPr>
         <p:spPr>
           <a:xfrm>
-            <a:off x="6096000" y="1398029"/>
-            <a:ext cx="5736196" cy="2529669"/>
+            <a:off x="695324" y="1583197"/>
+            <a:ext cx="2581137" cy="4893647"/>
           </a:xfrm>
           <a:prstGeom prst="rect">
             <a:avLst/>
           </a:prstGeom>
-        </p:spPr>
-      </p:pic>
-      <p:pic>
-        <p:nvPicPr>
-          <p:cNvPr id="13" name="Kép 12">
-            <a:extLst>
-              <a:ext uri="{FF2B5EF4-FFF2-40B4-BE49-F238E27FC236}">
-                <a16:creationId xmlns:a16="http://schemas.microsoft.com/office/drawing/2014/main" id="{E313FFB6-02BD-4E12-83C5-EEDA7A5B2327}"/>
-              </a:ext>
-            </a:extLst>
-          </p:cNvPr>
-          <p:cNvPicPr>
-            <a:picLocks noChangeAspect="1"/>
-          </p:cNvPicPr>
-          <p:nvPr/>
-        </p:nvPicPr>
-        <p:blipFill>
-          <a:blip r:embed="rId5">
-            <a:extLst>
-              <a:ext uri="{28A0092B-C50C-407E-A947-70E740481C1C}">
-                <a14:useLocalDpi xmlns:a14="http://schemas.microsoft.com/office/drawing/2010/main" val="0"/>
-              </a:ext>
-            </a:extLst>
-          </a:blip>
-          <a:stretch>
-            <a:fillRect/>
-          </a:stretch>
-        </p:blipFill>
-        <p:spPr>
-          <a:xfrm>
-            <a:off x="2709162" y="4006241"/>
-            <a:ext cx="5924639" cy="2810496"/>
-          </a:xfrm>
-          <a:prstGeom prst="rect">
-            <a:avLst/>
-          </a:prstGeom>
-        </p:spPr>
-      </p:pic>
+          <a:noFill/>
+        </p:spPr>
+        <p:txBody>
+          <a:bodyPr wrap="square" rtlCol="0">
+            <a:spAutoFit/>
+          </a:bodyPr>
+          <a:lstStyle/>
+          <a:p>
+            <a:pPr marL="285750" marR="0" lvl="0" indent="-285750" algn="l" defTabSz="914400" rtl="0" eaLnBrk="1" fontAlgn="auto" latinLnBrk="0" hangingPunct="1">
+              <a:lnSpc>
+                <a:spcPct val="100000"/>
+              </a:lnSpc>
+              <a:spcBef>
+                <a:spcPts val="0"/>
+              </a:spcBef>
+              <a:spcAft>
+                <a:spcPts val="0"/>
+              </a:spcAft>
+              <a:buClrTx/>
+              <a:buSzTx/>
+              <a:buFont typeface="Arial" panose="020B0604020202020204" pitchFamily="34" charset="0"/>
+              <a:buChar char="•"/>
+              <a:tabLst/>
+              <a:defRPr/>
+            </a:pPr>
+            <a:r>
+              <a:rPr lang="hu-HU" sz="2400" dirty="0">
+                <a:solidFill>
+                  <a:srgbClr val="FFFF00"/>
+                </a:solidFill>
+                <a:latin typeface="Impact" panose="020B0806030902050204" pitchFamily="34" charset="0"/>
+              </a:rPr>
+              <a:t>Itt láthatjuk a bevételeinket dátum szerint csoportosítva, a </a:t>
+            </a:r>
+            <a:r>
+              <a:rPr kumimoji="0" lang="hu-HU" sz="2400" b="0" i="0" u="none" strike="noStrike" kern="1200" cap="none" spc="0" normalizeH="0" baseline="0" noProof="0" dirty="0">
+                <a:ln>
+                  <a:noFill/>
+                </a:ln>
+                <a:solidFill>
+                  <a:srgbClr val="FFFF00"/>
+                </a:solidFill>
+                <a:effectLst/>
+                <a:uLnTx/>
+                <a:uFillTx/>
+                <a:latin typeface="Impact" panose="020B0806030902050204" pitchFamily="34" charset="0"/>
+                <a:ea typeface="+mn-ea"/>
+                <a:cs typeface="+mn-cs"/>
+              </a:rPr>
+              <a:t>legutóbbi bevétel jelenik meg elsőnek</a:t>
+            </a:r>
+          </a:p>
+          <a:p>
+            <a:pPr marL="285750" indent="-285750">
+              <a:buFont typeface="Arial" panose="020B0604020202020204" pitchFamily="34" charset="0"/>
+              <a:buChar char="•"/>
+            </a:pPr>
+            <a:endParaRPr lang="hu-HU" sz="2400" dirty="0">
+              <a:solidFill>
+                <a:srgbClr val="FFFF00"/>
+              </a:solidFill>
+              <a:latin typeface="Impact" panose="020B0806030902050204" pitchFamily="34" charset="0"/>
+            </a:endParaRPr>
+          </a:p>
+          <a:p>
+            <a:pPr marL="285750" indent="-285750">
+              <a:buFont typeface="Arial" panose="020B0604020202020204" pitchFamily="34" charset="0"/>
+              <a:buChar char="•"/>
+            </a:pPr>
+            <a:r>
+              <a:rPr lang="hu-HU" sz="2400" dirty="0">
+                <a:solidFill>
+                  <a:srgbClr val="FFFF00"/>
+                </a:solidFill>
+                <a:latin typeface="Impact" panose="020B0806030902050204" pitchFamily="34" charset="0"/>
+              </a:rPr>
+              <a:t>Itt tudunk hozzáadni, módosítani és törölni bevételeket</a:t>
+            </a:r>
+          </a:p>
+        </p:txBody>
+      </p:sp>
     </p:spTree>
     <p:extLst>
       <p:ext uri="{BB962C8B-B14F-4D97-AF65-F5344CB8AC3E}">
-        <p14:creationId xmlns:p14="http://schemas.microsoft.com/office/powerpoint/2010/main" val="967772040"/>
+        <p14:creationId xmlns:p14="http://schemas.microsoft.com/office/powerpoint/2010/main" val="3989958821"/>
       </p:ext>
     </p:extLst>
   </p:cSld>

</xml_diff>